<commit_message>
justification for Dijkstra algo is greedy approach
</commit_message>
<xml_diff>
--- a/Slides/2020-Even-DAA-L24-Greedy-Algo-SSSP-Dijkstra.pptx
+++ b/Slides/2020-Even-DAA-L24-Greedy-Algo-SSSP-Dijkstra.pptx
@@ -26,6 +26,7 @@
     <p:sldId id="271" r:id="rId23"/>
     <p:sldId id="272" r:id="rId24"/>
     <p:sldId id="273" r:id="rId25"/>
+    <p:sldId id="274" r:id="rId26"/>
   </p:sldIdLst>
   <p:sldSz cx="10160000" cy="7620000"/>
   <p:notesSz cx="6858000" cy="9144000"/>
@@ -5309,7 +5310,7 @@
       </p:grpSpPr>
       <p:sp>
         <p:nvSpPr>
-          <p:cNvPr id="208" name="Questions"/>
+          <p:cNvPr id="208" name="Greedy Approach: Disjkstra’s Algo"/>
           <p:cNvSpPr txBox="1"/>
           <p:nvPr>
             <p:ph type="title"/>
@@ -5326,14 +5327,14 @@
           <a:p>
             <a:pPr/>
             <a:r>
-              <a:t>Questions</a:t>
+              <a:t>Greedy Approach: Disjkstra’s Algo</a:t>
             </a:r>
           </a:p>
         </p:txBody>
       </p:sp>
       <p:sp>
         <p:nvSpPr>
-          <p:cNvPr id="209" name="Q1: what adjustments if any need to be made in Dijkstra’s algorithm to solve the single-source shortest-paths problem for directed weighted graphs.…"/>
+          <p:cNvPr id="209" name="Greedy Approach:…"/>
           <p:cNvSpPr txBox="1"/>
           <p:nvPr>
             <p:ph type="body" idx="1"/>
@@ -5348,42 +5349,70 @@
           <a:bodyPr/>
           <a:lstStyle/>
           <a:p>
-            <a:pPr>
-              <a:defRPr sz="3000"/>
+            <a:pPr/>
+            <a:r>
+              <a:t>Greedy Approach:</a:t>
+            </a:r>
+          </a:p>
+          <a:p>
+            <a:pPr lvl="1"/>
+            <a:r>
+              <a:t>Make a sequence of choices</a:t>
+            </a:r>
+          </a:p>
+          <a:p>
+            <a:pPr lvl="2"/>
+            <a:r>
+              <a:t>One choice at a time</a:t>
+            </a:r>
+          </a:p>
+          <a:p>
+            <a:pPr lvl="1"/>
+            <a:r>
+              <a:t>Next choice is based on current best value</a:t>
+            </a:r>
+          </a:p>
+          <a:p>
+            <a:pPr lvl="2"/>
+            <a:r>
+              <a:t>Once a choice is made (a node is chosen), this choice is never changed</a:t>
+            </a:r>
+          </a:p>
+          <a:p>
+            <a:pPr marL="289718" indent="-250031">
+              <a:spcBef>
+                <a:spcPts val="500"/>
+              </a:spcBef>
+              <a:defRPr sz="2800"/>
             </a:pPr>
             <a:r>
-              <a:t>Q</a:t>
-            </a:r>
-            <a:r>
-              <a:rPr>
-                <a:latin typeface="Arial"/>
-                <a:ea typeface="Arial"/>
-                <a:cs typeface="Arial"/>
-                <a:sym typeface="Arial"/>
-              </a:rPr>
-              <a:t>1</a:t>
-            </a:r>
-            <a:r>
-              <a:t>: what adjustments if any need to be made in Dijkstra’s algorithm to solve the single-source shortest-paths problem for directed weighted graphs. </a:t>
-            </a:r>
-          </a:p>
-          <a:p>
-            <a:pPr>
-              <a:defRPr sz="3000"/>
-            </a:pPr>
-            <a:r>
-              <a:t>Ans:</a:t>
-            </a:r>
-          </a:p>
-          <a:p>
-            <a:pPr lvl="1" marL="738187" indent="-342900">
+              <a:t>Dijkstra’s Algo:</a:t>
+            </a:r>
+          </a:p>
+          <a:p>
+            <a:pPr lvl="1" marL="645318" indent="-250031">
               <a:spcBef>
-                <a:spcPts val="700"/>
+                <a:spcPts val="500"/>
               </a:spcBef>
               <a:buChar char="•"/>
+              <a:defRPr sz="2800"/>
             </a:pPr>
             <a:r>
-              <a:t>Do we need any changes? Just follow the directed edges.</a:t>
+              <a:t>Select vertex with minimum disance from source </a:t>
+            </a:r>
+          </a:p>
+          <a:p>
+            <a:pPr lvl="2" marL="1102518" indent="-250031"/>
+            <a:r>
+              <a:t>(from via previously selected vertices)</a:t>
+            </a:r>
+          </a:p>
+          <a:p>
+            <a:pPr lvl="1" marL="663178" indent="-267890">
+              <a:buChar char="•"/>
+            </a:pPr>
+            <a:r>
+              <a:t>Greedy approach is optimal in this case</a:t>
             </a:r>
           </a:p>
         </p:txBody>
@@ -5501,211 +5530,6 @@
     <a:masterClrMapping/>
   </p:clrMapOvr>
   <p:transition xmlns:p14="http://schemas.microsoft.com/office/powerpoint/2010/main" spd="med" advClick="1"/>
-  <p:timing>
-    <p:tnLst>
-      <p:par>
-        <p:cTn id="1" nodeType="tmRoot" restart="never" dur="indefinite" fill="hold">
-          <p:childTnLst>
-            <p:seq concurrent="1" prevAc="none" nextAc="seek">
-              <p:cTn id="2" nodeType="mainSeq" dur="indefinite" fill="hold">
-                <p:childTnLst>
-                  <p:par>
-                    <p:cTn id="3" fill="hold">
-                      <p:stCondLst>
-                        <p:cond delay="indefinite"/>
-                      </p:stCondLst>
-                      <p:childTnLst>
-                        <p:par>
-                          <p:cTn id="4" fill="hold">
-                            <p:stCondLst>
-                              <p:cond delay="0"/>
-                            </p:stCondLst>
-                            <p:childTnLst>
-                              <p:par>
-                                <p:cTn id="5" presetClass="entr" nodeType="clickEffect" presetSubtype="0" presetID="1" grpId="1" fill="hold">
-                                  <p:stCondLst>
-                                    <p:cond delay="0"/>
-                                  </p:stCondLst>
-                                  <p:iterate type="el" backwards="0">
-                                    <p:tmAbs val="0"/>
-                                  </p:iterate>
-                                  <p:childTnLst>
-                                    <p:set>
-                                      <p:cBhvr>
-                                        <p:cTn id="6" fill="hold"/>
-                                        <p:tgtEl>
-                                          <p:spTgt spid="209">
-                                            <p:bg/>
-                                          </p:spTgt>
-                                        </p:tgtEl>
-                                        <p:attrNameLst>
-                                          <p:attrName>style.visibility</p:attrName>
-                                        </p:attrNameLst>
-                                      </p:cBhvr>
-                                      <p:to>
-                                        <p:strVal val="visible"/>
-                                      </p:to>
-                                    </p:set>
-                                  </p:childTnLst>
-                                </p:cTn>
-                              </p:par>
-                              <p:par>
-                                <p:cTn id="7" presetClass="entr" nodeType="withEffect" presetSubtype="0" presetID="1" grpId="1" fill="hold">
-                                  <p:stCondLst>
-                                    <p:cond delay="0"/>
-                                  </p:stCondLst>
-                                  <p:iterate type="el" backwards="0">
-                                    <p:tmAbs val="0"/>
-                                  </p:iterate>
-                                  <p:childTnLst>
-                                    <p:set>
-                                      <p:cBhvr>
-                                        <p:cTn id="8" fill="hold"/>
-                                        <p:tgtEl>
-                                          <p:spTgt spid="209">
-                                            <p:txEl>
-                                              <p:pRg st="0" end="0"/>
-                                            </p:txEl>
-                                          </p:spTgt>
-                                        </p:tgtEl>
-                                        <p:attrNameLst>
-                                          <p:attrName>style.visibility</p:attrName>
-                                        </p:attrNameLst>
-                                      </p:cBhvr>
-                                      <p:to>
-                                        <p:strVal val="visible"/>
-                                      </p:to>
-                                    </p:set>
-                                  </p:childTnLst>
-                                </p:cTn>
-                              </p:par>
-                            </p:childTnLst>
-                          </p:cTn>
-                        </p:par>
-                      </p:childTnLst>
-                    </p:cTn>
-                  </p:par>
-                  <p:par>
-                    <p:cTn id="9" fill="hold">
-                      <p:stCondLst>
-                        <p:cond delay="indefinite"/>
-                      </p:stCondLst>
-                      <p:childTnLst>
-                        <p:par>
-                          <p:cTn id="10" fill="hold">
-                            <p:stCondLst>
-                              <p:cond delay="0"/>
-                            </p:stCondLst>
-                            <p:childTnLst>
-                              <p:par>
-                                <p:cTn id="11" presetClass="entr" nodeType="clickEffect" presetSubtype="0" presetID="1" grpId="1" fill="hold">
-                                  <p:stCondLst>
-                                    <p:cond delay="0"/>
-                                  </p:stCondLst>
-                                  <p:iterate type="el" backwards="0">
-                                    <p:tmAbs val="0"/>
-                                  </p:iterate>
-                                  <p:childTnLst>
-                                    <p:set>
-                                      <p:cBhvr>
-                                        <p:cTn id="12" fill="hold"/>
-                                        <p:tgtEl>
-                                          <p:spTgt spid="209">
-                                            <p:txEl>
-                                              <p:pRg st="1" end="1"/>
-                                            </p:txEl>
-                                          </p:spTgt>
-                                        </p:tgtEl>
-                                        <p:attrNameLst>
-                                          <p:attrName>style.visibility</p:attrName>
-                                        </p:attrNameLst>
-                                      </p:cBhvr>
-                                      <p:to>
-                                        <p:strVal val="visible"/>
-                                      </p:to>
-                                    </p:set>
-                                  </p:childTnLst>
-                                </p:cTn>
-                              </p:par>
-                            </p:childTnLst>
-                          </p:cTn>
-                        </p:par>
-                      </p:childTnLst>
-                    </p:cTn>
-                  </p:par>
-                  <p:par>
-                    <p:cTn id="13" fill="hold">
-                      <p:stCondLst>
-                        <p:cond delay="indefinite"/>
-                      </p:stCondLst>
-                      <p:childTnLst>
-                        <p:par>
-                          <p:cTn id="14" fill="hold">
-                            <p:stCondLst>
-                              <p:cond delay="0"/>
-                            </p:stCondLst>
-                            <p:childTnLst>
-                              <p:par>
-                                <p:cTn id="15" presetClass="entr" nodeType="clickEffect" presetSubtype="0" presetID="1" grpId="1" fill="hold">
-                                  <p:stCondLst>
-                                    <p:cond delay="0"/>
-                                  </p:stCondLst>
-                                  <p:iterate type="el" backwards="0">
-                                    <p:tmAbs val="0"/>
-                                  </p:iterate>
-                                  <p:childTnLst>
-                                    <p:set>
-                                      <p:cBhvr>
-                                        <p:cTn id="16" fill="hold"/>
-                                        <p:tgtEl>
-                                          <p:spTgt spid="209">
-                                            <p:txEl>
-                                              <p:pRg st="2" end="2"/>
-                                            </p:txEl>
-                                          </p:spTgt>
-                                        </p:tgtEl>
-                                        <p:attrNameLst>
-                                          <p:attrName>style.visibility</p:attrName>
-                                        </p:attrNameLst>
-                                      </p:cBhvr>
-                                      <p:to>
-                                        <p:strVal val="visible"/>
-                                      </p:to>
-                                    </p:set>
-                                  </p:childTnLst>
-                                </p:cTn>
-                              </p:par>
-                            </p:childTnLst>
-                          </p:cTn>
-                        </p:par>
-                      </p:childTnLst>
-                    </p:cTn>
-                  </p:par>
-                </p:childTnLst>
-              </p:cTn>
-              <p:prevCondLst>
-                <p:cond evt="onPrev">
-                  <p:tgtEl>
-                    <p:sldTgt/>
-                  </p:tgtEl>
-                </p:cond>
-              </p:prevCondLst>
-              <p:nextCondLst>
-                <p:cond evt="onNext">
-                  <p:tgtEl>
-                    <p:sldTgt/>
-                  </p:tgtEl>
-                </p:cond>
-              </p:nextCondLst>
-            </p:seq>
-          </p:childTnLst>
-        </p:cTn>
-      </p:par>
-    </p:tnLst>
-    <p:bldLst>
-      <p:bldP build="p" bldLvl="5" animBg="1" rev="0" advAuto="0" spid="209" grpId="1"/>
-    </p:bldLst>
-  </p:timing>
 </p:sld>
 </file>
 
@@ -5752,7 +5576,7 @@
       </p:sp>
       <p:sp>
         <p:nvSpPr>
-          <p:cNvPr id="215" name="Q2: Find a shortest path between two given vertices of a weighted graph or digraph. (This variation is called the single-pair shortest-path problem.)…"/>
+          <p:cNvPr id="215" name="Q1: what adjustments if any need to be made in Dijkstra’s algorithm to solve the single-source shortest-paths problem for directed weighted graphs.…"/>
           <p:cNvSpPr txBox="1"/>
           <p:nvPr>
             <p:ph type="body" idx="1"/>
@@ -5771,25 +5595,38 @@
               <a:defRPr sz="3000"/>
             </a:pPr>
             <a:r>
-              <a:t>Q2: Find a shortest path between two given vertices of a weighted graph or digraph. (This variation is called the single-pair shortest-path problem.) </a:t>
-            </a:r>
-          </a:p>
-          <a:p>
-            <a:pPr/>
+              <a:t>Q</a:t>
+            </a:r>
+            <a:r>
+              <a:rPr>
+                <a:latin typeface="Arial"/>
+                <a:ea typeface="Arial"/>
+                <a:cs typeface="Arial"/>
+                <a:sym typeface="Arial"/>
+              </a:rPr>
+              <a:t>1</a:t>
+            </a:r>
+            <a:r>
+              <a:t>: what adjustments if any need to be made in Dijkstra’s algorithm to solve the single-source shortest-paths problem for directed weighted graphs. </a:t>
+            </a:r>
+          </a:p>
+          <a:p>
+            <a:pPr>
+              <a:defRPr sz="3000"/>
+            </a:pPr>
             <a:r>
               <a:t>Ans:</a:t>
             </a:r>
           </a:p>
           <a:p>
-            <a:pPr lvl="1"/>
-            <a:r>
-              <a:t>Start from one vertex as source</a:t>
-            </a:r>
-          </a:p>
-          <a:p>
-            <a:pPr lvl="1"/>
-            <a:r>
-              <a:t>Iterate the for loop till you find 2nd vertex.</a:t>
+            <a:pPr lvl="1" marL="738187" indent="-342900">
+              <a:spcBef>
+                <a:spcPts val="700"/>
+              </a:spcBef>
+              <a:buChar char="•"/>
+            </a:pPr>
+            <a:r>
+              <a:t>Do we need any changes? Just follow the directed edges.</a:t>
             </a:r>
           </a:p>
         </p:txBody>
@@ -6087,54 +5924,6 @@
                       </p:childTnLst>
                     </p:cTn>
                   </p:par>
-                  <p:par>
-                    <p:cTn id="17" fill="hold">
-                      <p:stCondLst>
-                        <p:cond delay="indefinite"/>
-                      </p:stCondLst>
-                      <p:childTnLst>
-                        <p:par>
-                          <p:cTn id="18" fill="hold">
-                            <p:stCondLst>
-                              <p:cond delay="0"/>
-                            </p:stCondLst>
-                            <p:childTnLst>
-                              <p:par>
-                                <p:cTn id="19" presetClass="entr" nodeType="clickEffect" presetSubtype="0" presetID="1" grpId="1" fill="hold">
-                                  <p:stCondLst>
-                                    <p:cond delay="0"/>
-                                  </p:stCondLst>
-                                  <p:iterate type="el" backwards="0">
-                                    <p:tmAbs val="0"/>
-                                  </p:iterate>
-                                  <p:childTnLst>
-                                    <p:set>
-                                      <p:cBhvr>
-                                        <p:cTn id="20" fill="hold"/>
-                                        <p:tgtEl>
-                                          <p:spTgt spid="215">
-                                            <p:txEl>
-                                              <p:pRg st="3" end="3"/>
-                                            </p:txEl>
-                                          </p:spTgt>
-                                        </p:tgtEl>
-                                        <p:attrNameLst>
-                                          <p:attrName>style.visibility</p:attrName>
-                                        </p:attrNameLst>
-                                      </p:cBhvr>
-                                      <p:to>
-                                        <p:strVal val="visible"/>
-                                      </p:to>
-                                    </p:set>
-                                  </p:childTnLst>
-                                </p:cTn>
-                              </p:par>
-                            </p:childTnLst>
-                          </p:cTn>
-                        </p:par>
-                      </p:childTnLst>
-                    </p:cTn>
-                  </p:par>
                 </p:childTnLst>
               </p:cTn>
               <p:prevCondLst>
@@ -6206,17 +5995,13 @@
       </p:sp>
       <p:sp>
         <p:nvSpPr>
-          <p:cNvPr id="221" name="Q3: Find the shortest paths to a given vertex from each other vertex of a weighted graph. (This variation is called the single destination shortest-paths problem.)…"/>
+          <p:cNvPr id="221" name="Q2: Find a shortest path between two given vertices of a weighted graph or digraph. (This variation is called the single-pair shortest-path problem.)…"/>
           <p:cNvSpPr txBox="1"/>
           <p:nvPr>
             <p:ph type="body" idx="1"/>
           </p:nvPr>
         </p:nvSpPr>
         <p:spPr>
-          <a:xfrm>
-            <a:off x="666288" y="938113"/>
-            <a:ext cx="9264377" cy="5891610"/>
-          </a:xfrm>
           <a:prstGeom prst="rect">
             <a:avLst/>
           </a:prstGeom>
@@ -6225,107 +6010,29 @@
           <a:bodyPr/>
           <a:lstStyle/>
           <a:p>
+            <a:pPr>
+              <a:defRPr sz="3000"/>
+            </a:pPr>
+            <a:r>
+              <a:t>Q2: Find a shortest path between two given vertices of a weighted graph or digraph. (This variation is called the single-pair shortest-path problem.) </a:t>
+            </a:r>
+          </a:p>
+          <a:p>
             <a:pPr/>
             <a:r>
-              <a:t>Q3: </a:t>
-            </a:r>
-            <a:r>
-              <a:rPr sz="3000"/>
-              <a:t>Find the shortest paths to a given vertex from each other vertex of a weighted graph. (This variation is called the single destination shortest-paths problem.)</a:t>
-            </a:r>
-            <a:endParaRPr sz="3000"/>
-          </a:p>
-          <a:p>
-            <a:pPr marL="350440" indent="-310753">
-              <a:defRPr sz="2900"/>
-            </a:pPr>
-            <a:r>
-              <a:t>Ans: Undirected graph</a:t>
-            </a:r>
-          </a:p>
-          <a:p>
-            <a:pPr lvl="1" marL="671512" indent="-276225">
-              <a:spcBef>
-                <a:spcPts val="700"/>
-              </a:spcBef>
-              <a:defRPr sz="2900"/>
-            </a:pPr>
-            <a:r>
-              <a:t>Start from the destination vertex as source</a:t>
-            </a:r>
-          </a:p>
-          <a:p>
-            <a:pPr lvl="1" marL="671512" indent="-276225">
-              <a:spcBef>
-                <a:spcPts val="700"/>
-              </a:spcBef>
-              <a:defRPr sz="2900"/>
-            </a:pPr>
-            <a:r>
-              <a:t>Find the shortest path from this to all other vertices</a:t>
-            </a:r>
-          </a:p>
-          <a:p>
-            <a:pPr lvl="1" marL="671512" indent="-276225">
-              <a:spcBef>
-                <a:spcPts val="700"/>
-              </a:spcBef>
-              <a:defRPr sz="2900"/>
-            </a:pPr>
-            <a:r>
-              <a:t>Reverse the path</a:t>
-            </a:r>
-          </a:p>
-          <a:p>
-            <a:pPr marL="350440" indent="-310753">
-              <a:defRPr sz="2900"/>
-            </a:pPr>
-            <a:r>
-              <a:t>Ans: directed graph</a:t>
-            </a:r>
-          </a:p>
-          <a:p>
-            <a:pPr lvl="1" marL="671512" indent="-276225">
-              <a:spcBef>
-                <a:spcPts val="700"/>
-              </a:spcBef>
-              <a:defRPr sz="2900"/>
-            </a:pPr>
-            <a:r>
-              <a:t>Reverse the direction of all edges.</a:t>
-            </a:r>
-          </a:p>
-          <a:p>
-            <a:pPr lvl="1" marL="671512" indent="-276225">
-              <a:spcBef>
-                <a:spcPts val="700"/>
-              </a:spcBef>
-              <a:defRPr sz="2900"/>
-            </a:pPr>
-            <a:r>
-              <a:t>Start from the destination vertex as source</a:t>
-            </a:r>
-          </a:p>
-          <a:p>
-            <a:pPr lvl="1" marL="671512" indent="-276225">
-              <a:spcBef>
-                <a:spcPts val="700"/>
-              </a:spcBef>
-              <a:defRPr sz="2900"/>
-            </a:pPr>
-            <a:r>
-              <a:t>Find the shortest path from this src to all other vertices</a:t>
-            </a:r>
-          </a:p>
-          <a:p>
-            <a:pPr lvl="1" marL="671512" indent="-276225">
-              <a:spcBef>
-                <a:spcPts val="700"/>
-              </a:spcBef>
-              <a:defRPr sz="2900"/>
-            </a:pPr>
-            <a:r>
-              <a:t>Reverse the path</a:t>
+              <a:t>Ans:</a:t>
+            </a:r>
+          </a:p>
+          <a:p>
+            <a:pPr lvl="1"/>
+            <a:r>
+              <a:t>Start from one vertex as source</a:t>
+            </a:r>
+          </a:p>
+          <a:p>
+            <a:pPr lvl="1"/>
+            <a:r>
+              <a:t>Iterate the for loop till you find 2nd vertex.</a:t>
             </a:r>
           </a:p>
         </p:txBody>
@@ -6671,294 +6378,6 @@
                       </p:childTnLst>
                     </p:cTn>
                   </p:par>
-                  <p:par>
-                    <p:cTn id="21" fill="hold">
-                      <p:stCondLst>
-                        <p:cond delay="indefinite"/>
-                      </p:stCondLst>
-                      <p:childTnLst>
-                        <p:par>
-                          <p:cTn id="22" fill="hold">
-                            <p:stCondLst>
-                              <p:cond delay="0"/>
-                            </p:stCondLst>
-                            <p:childTnLst>
-                              <p:par>
-                                <p:cTn id="23" presetClass="entr" nodeType="clickEffect" presetSubtype="0" presetID="1" grpId="1" fill="hold">
-                                  <p:stCondLst>
-                                    <p:cond delay="0"/>
-                                  </p:stCondLst>
-                                  <p:iterate type="el" backwards="0">
-                                    <p:tmAbs val="0"/>
-                                  </p:iterate>
-                                  <p:childTnLst>
-                                    <p:set>
-                                      <p:cBhvr>
-                                        <p:cTn id="24" fill="hold"/>
-                                        <p:tgtEl>
-                                          <p:spTgt spid="221">
-                                            <p:txEl>
-                                              <p:pRg st="4" end="4"/>
-                                            </p:txEl>
-                                          </p:spTgt>
-                                        </p:tgtEl>
-                                        <p:attrNameLst>
-                                          <p:attrName>style.visibility</p:attrName>
-                                        </p:attrNameLst>
-                                      </p:cBhvr>
-                                      <p:to>
-                                        <p:strVal val="visible"/>
-                                      </p:to>
-                                    </p:set>
-                                  </p:childTnLst>
-                                </p:cTn>
-                              </p:par>
-                            </p:childTnLst>
-                          </p:cTn>
-                        </p:par>
-                      </p:childTnLst>
-                    </p:cTn>
-                  </p:par>
-                  <p:par>
-                    <p:cTn id="25" fill="hold">
-                      <p:stCondLst>
-                        <p:cond delay="indefinite"/>
-                      </p:stCondLst>
-                      <p:childTnLst>
-                        <p:par>
-                          <p:cTn id="26" fill="hold">
-                            <p:stCondLst>
-                              <p:cond delay="0"/>
-                            </p:stCondLst>
-                            <p:childTnLst>
-                              <p:par>
-                                <p:cTn id="27" presetClass="entr" nodeType="clickEffect" presetSubtype="0" presetID="1" grpId="1" fill="hold">
-                                  <p:stCondLst>
-                                    <p:cond delay="0"/>
-                                  </p:stCondLst>
-                                  <p:iterate type="el" backwards="0">
-                                    <p:tmAbs val="0"/>
-                                  </p:iterate>
-                                  <p:childTnLst>
-                                    <p:set>
-                                      <p:cBhvr>
-                                        <p:cTn id="28" fill="hold"/>
-                                        <p:tgtEl>
-                                          <p:spTgt spid="221">
-                                            <p:txEl>
-                                              <p:pRg st="5" end="5"/>
-                                            </p:txEl>
-                                          </p:spTgt>
-                                        </p:tgtEl>
-                                        <p:attrNameLst>
-                                          <p:attrName>style.visibility</p:attrName>
-                                        </p:attrNameLst>
-                                      </p:cBhvr>
-                                      <p:to>
-                                        <p:strVal val="visible"/>
-                                      </p:to>
-                                    </p:set>
-                                  </p:childTnLst>
-                                </p:cTn>
-                              </p:par>
-                            </p:childTnLst>
-                          </p:cTn>
-                        </p:par>
-                      </p:childTnLst>
-                    </p:cTn>
-                  </p:par>
-                  <p:par>
-                    <p:cTn id="29" fill="hold">
-                      <p:stCondLst>
-                        <p:cond delay="indefinite"/>
-                      </p:stCondLst>
-                      <p:childTnLst>
-                        <p:par>
-                          <p:cTn id="30" fill="hold">
-                            <p:stCondLst>
-                              <p:cond delay="0"/>
-                            </p:stCondLst>
-                            <p:childTnLst>
-                              <p:par>
-                                <p:cTn id="31" presetClass="entr" nodeType="clickEffect" presetSubtype="0" presetID="1" grpId="1" fill="hold">
-                                  <p:stCondLst>
-                                    <p:cond delay="0"/>
-                                  </p:stCondLst>
-                                  <p:iterate type="el" backwards="0">
-                                    <p:tmAbs val="0"/>
-                                  </p:iterate>
-                                  <p:childTnLst>
-                                    <p:set>
-                                      <p:cBhvr>
-                                        <p:cTn id="32" fill="hold"/>
-                                        <p:tgtEl>
-                                          <p:spTgt spid="221">
-                                            <p:txEl>
-                                              <p:pRg st="6" end="6"/>
-                                            </p:txEl>
-                                          </p:spTgt>
-                                        </p:tgtEl>
-                                        <p:attrNameLst>
-                                          <p:attrName>style.visibility</p:attrName>
-                                        </p:attrNameLst>
-                                      </p:cBhvr>
-                                      <p:to>
-                                        <p:strVal val="visible"/>
-                                      </p:to>
-                                    </p:set>
-                                  </p:childTnLst>
-                                </p:cTn>
-                              </p:par>
-                            </p:childTnLst>
-                          </p:cTn>
-                        </p:par>
-                      </p:childTnLst>
-                    </p:cTn>
-                  </p:par>
-                  <p:par>
-                    <p:cTn id="33" fill="hold">
-                      <p:stCondLst>
-                        <p:cond delay="indefinite"/>
-                      </p:stCondLst>
-                      <p:childTnLst>
-                        <p:par>
-                          <p:cTn id="34" fill="hold">
-                            <p:stCondLst>
-                              <p:cond delay="0"/>
-                            </p:stCondLst>
-                            <p:childTnLst>
-                              <p:par>
-                                <p:cTn id="35" presetClass="entr" nodeType="clickEffect" presetSubtype="0" presetID="1" grpId="1" fill="hold">
-                                  <p:stCondLst>
-                                    <p:cond delay="0"/>
-                                  </p:stCondLst>
-                                  <p:iterate type="el" backwards="0">
-                                    <p:tmAbs val="0"/>
-                                  </p:iterate>
-                                  <p:childTnLst>
-                                    <p:set>
-                                      <p:cBhvr>
-                                        <p:cTn id="36" fill="hold"/>
-                                        <p:tgtEl>
-                                          <p:spTgt spid="221">
-                                            <p:txEl>
-                                              <p:pRg st="7" end="7"/>
-                                            </p:txEl>
-                                          </p:spTgt>
-                                        </p:tgtEl>
-                                        <p:attrNameLst>
-                                          <p:attrName>style.visibility</p:attrName>
-                                        </p:attrNameLst>
-                                      </p:cBhvr>
-                                      <p:to>
-                                        <p:strVal val="visible"/>
-                                      </p:to>
-                                    </p:set>
-                                  </p:childTnLst>
-                                </p:cTn>
-                              </p:par>
-                            </p:childTnLst>
-                          </p:cTn>
-                        </p:par>
-                      </p:childTnLst>
-                    </p:cTn>
-                  </p:par>
-                  <p:par>
-                    <p:cTn id="37" fill="hold">
-                      <p:stCondLst>
-                        <p:cond delay="indefinite"/>
-                      </p:stCondLst>
-                      <p:childTnLst>
-                        <p:par>
-                          <p:cTn id="38" fill="hold">
-                            <p:stCondLst>
-                              <p:cond delay="0"/>
-                            </p:stCondLst>
-                            <p:childTnLst>
-                              <p:par>
-                                <p:cTn id="39" presetClass="entr" nodeType="clickEffect" presetSubtype="0" presetID="1" grpId="1" fill="hold">
-                                  <p:stCondLst>
-                                    <p:cond delay="0"/>
-                                  </p:stCondLst>
-                                  <p:iterate type="el" backwards="0">
-                                    <p:tmAbs val="0"/>
-                                  </p:iterate>
-                                  <p:childTnLst>
-                                    <p:set>
-                                      <p:cBhvr>
-                                        <p:cTn id="40" fill="hold"/>
-                                        <p:tgtEl>
-                                          <p:spTgt spid="221">
-                                            <p:txEl>
-                                              <p:pRg st="8" end="8"/>
-                                            </p:txEl>
-                                          </p:spTgt>
-                                        </p:tgtEl>
-                                        <p:attrNameLst>
-                                          <p:attrName>style.visibility</p:attrName>
-                                        </p:attrNameLst>
-                                      </p:cBhvr>
-                                      <p:to>
-                                        <p:strVal val="visible"/>
-                                      </p:to>
-                                    </p:set>
-                                  </p:childTnLst>
-                                </p:cTn>
-                              </p:par>
-                            </p:childTnLst>
-                          </p:cTn>
-                        </p:par>
-                      </p:childTnLst>
-                    </p:cTn>
-                  </p:par>
-                  <p:par>
-                    <p:cTn id="41" fill="hold">
-                      <p:stCondLst>
-                        <p:cond delay="indefinite"/>
-                      </p:stCondLst>
-                      <p:childTnLst>
-                        <p:par>
-                          <p:cTn id="42" fill="hold">
-                            <p:stCondLst>
-                              <p:cond delay="0"/>
-                            </p:stCondLst>
-                            <p:childTnLst>
-                              <p:par>
-                                <p:cTn id="43" presetClass="entr" nodeType="clickEffect" presetSubtype="0" presetID="1" grpId="1" fill="hold">
-                                  <p:stCondLst>
-                                    <p:cond delay="0"/>
-                                  </p:stCondLst>
-                                  <p:iterate type="el" backwards="0">
-                                    <p:tmAbs val="0"/>
-                                  </p:iterate>
-                                  <p:childTnLst>
-                                    <p:set>
-                                      <p:cBhvr>
-                                        <p:cTn id="44" fill="hold"/>
-                                        <p:tgtEl>
-                                          <p:spTgt spid="221">
-                                            <p:txEl>
-                                              <p:pRg st="9" end="9"/>
-                                            </p:txEl>
-                                          </p:spTgt>
-                                        </p:tgtEl>
-                                        <p:attrNameLst>
-                                          <p:attrName>style.visibility</p:attrName>
-                                        </p:attrNameLst>
-                                      </p:cBhvr>
-                                      <p:to>
-                                        <p:strVal val="visible"/>
-                                      </p:to>
-                                    </p:set>
-                                  </p:childTnLst>
-                                </p:cTn>
-                              </p:par>
-                            </p:childTnLst>
-                          </p:cTn>
-                        </p:par>
-                      </p:childTnLst>
-                    </p:cTn>
-                  </p:par>
                 </p:childTnLst>
               </p:cTn>
               <p:prevCondLst>
@@ -7030,13 +6449,17 @@
       </p:sp>
       <p:sp>
         <p:nvSpPr>
-          <p:cNvPr id="227" name="Q4: Solve the single-source shortest-path problem in a graph with non-negative numbers assigned to its vertices (and the length of a path defined as the sum of the vertex numbers on the path).…"/>
+          <p:cNvPr id="227" name="Q3: Find the shortest paths to a given vertex from each other vertex of a weighted graph. (This variation is called the single destination shortest-paths problem.)…"/>
           <p:cNvSpPr txBox="1"/>
           <p:nvPr>
             <p:ph type="body" idx="1"/>
           </p:nvPr>
         </p:nvSpPr>
         <p:spPr>
+          <a:xfrm>
+            <a:off x="666288" y="938113"/>
+            <a:ext cx="9264377" cy="5891610"/>
+          </a:xfrm>
           <a:prstGeom prst="rect">
             <a:avLst/>
           </a:prstGeom>
@@ -7045,26 +6468,107 @@
           <a:bodyPr/>
           <a:lstStyle/>
           <a:p>
-            <a:pPr marL="350440" indent="-310753"/>
-            <a:r>
-              <a:rPr sz="2900"/>
-              <a:t>Q4: Solve the single-source shortest-path problem in a graph with non-negative numbers assigned to its vertices (and the length of a path defined as the sum of the vertex numbers on the path).</a:t>
-            </a:r>
-            <a:endParaRPr sz="2900"/>
-          </a:p>
-          <a:p>
-            <a:pPr marL="350440" indent="-310753"/>
-            <a:r>
-              <a:rPr sz="2900"/>
-              <a:t>Hint: </a:t>
-            </a:r>
-            <a:endParaRPr sz="2900"/>
-          </a:p>
-          <a:p>
-            <a:pPr lvl="1" marL="671512" indent="-276225"/>
-            <a:r>
-              <a:rPr sz="2900"/>
-              <a:t>The weight of the edge is sum of non-negative numbers assigned to vertices of the corresponding edge.</a:t>
+            <a:pPr/>
+            <a:r>
+              <a:t>Q3: </a:t>
+            </a:r>
+            <a:r>
+              <a:rPr sz="3000"/>
+              <a:t>Find the shortest paths to a given vertex from each other vertex of a weighted graph. (This variation is called the single destination shortest-paths problem.)</a:t>
+            </a:r>
+            <a:endParaRPr sz="3000"/>
+          </a:p>
+          <a:p>
+            <a:pPr marL="350440" indent="-310753">
+              <a:defRPr sz="2900"/>
+            </a:pPr>
+            <a:r>
+              <a:t>Ans: Undirected graph</a:t>
+            </a:r>
+          </a:p>
+          <a:p>
+            <a:pPr lvl="1" marL="671512" indent="-276225">
+              <a:spcBef>
+                <a:spcPts val="700"/>
+              </a:spcBef>
+              <a:defRPr sz="2900"/>
+            </a:pPr>
+            <a:r>
+              <a:t>Start from the destination vertex as source</a:t>
+            </a:r>
+          </a:p>
+          <a:p>
+            <a:pPr lvl="1" marL="671512" indent="-276225">
+              <a:spcBef>
+                <a:spcPts val="700"/>
+              </a:spcBef>
+              <a:defRPr sz="2900"/>
+            </a:pPr>
+            <a:r>
+              <a:t>Find the shortest path from this to all other vertices</a:t>
+            </a:r>
+          </a:p>
+          <a:p>
+            <a:pPr lvl="1" marL="671512" indent="-276225">
+              <a:spcBef>
+                <a:spcPts val="700"/>
+              </a:spcBef>
+              <a:defRPr sz="2900"/>
+            </a:pPr>
+            <a:r>
+              <a:t>Reverse the path</a:t>
+            </a:r>
+          </a:p>
+          <a:p>
+            <a:pPr marL="350440" indent="-310753">
+              <a:defRPr sz="2900"/>
+            </a:pPr>
+            <a:r>
+              <a:t>Ans: directed graph</a:t>
+            </a:r>
+          </a:p>
+          <a:p>
+            <a:pPr lvl="1" marL="671512" indent="-276225">
+              <a:spcBef>
+                <a:spcPts val="700"/>
+              </a:spcBef>
+              <a:defRPr sz="2900"/>
+            </a:pPr>
+            <a:r>
+              <a:t>Reverse the direction of all edges.</a:t>
+            </a:r>
+          </a:p>
+          <a:p>
+            <a:pPr lvl="1" marL="671512" indent="-276225">
+              <a:spcBef>
+                <a:spcPts val="700"/>
+              </a:spcBef>
+              <a:defRPr sz="2900"/>
+            </a:pPr>
+            <a:r>
+              <a:t>Start from the destination vertex as source</a:t>
+            </a:r>
+          </a:p>
+          <a:p>
+            <a:pPr lvl="1" marL="671512" indent="-276225">
+              <a:spcBef>
+                <a:spcPts val="700"/>
+              </a:spcBef>
+              <a:defRPr sz="2900"/>
+            </a:pPr>
+            <a:r>
+              <a:t>Find the shortest path from this src to all other vertices</a:t>
+            </a:r>
+          </a:p>
+          <a:p>
+            <a:pPr lvl="1" marL="671512" indent="-276225">
+              <a:spcBef>
+                <a:spcPts val="700"/>
+              </a:spcBef>
+              <a:defRPr sz="2900"/>
+            </a:pPr>
+            <a:r>
+              <a:t>Reverse the path</a:t>
             </a:r>
           </a:p>
         </p:txBody>
@@ -7362,6 +6866,342 @@
                       </p:childTnLst>
                     </p:cTn>
                   </p:par>
+                  <p:par>
+                    <p:cTn id="17" fill="hold">
+                      <p:stCondLst>
+                        <p:cond delay="indefinite"/>
+                      </p:stCondLst>
+                      <p:childTnLst>
+                        <p:par>
+                          <p:cTn id="18" fill="hold">
+                            <p:stCondLst>
+                              <p:cond delay="0"/>
+                            </p:stCondLst>
+                            <p:childTnLst>
+                              <p:par>
+                                <p:cTn id="19" presetClass="entr" nodeType="clickEffect" presetSubtype="0" presetID="1" grpId="1" fill="hold">
+                                  <p:stCondLst>
+                                    <p:cond delay="0"/>
+                                  </p:stCondLst>
+                                  <p:iterate type="el" backwards="0">
+                                    <p:tmAbs val="0"/>
+                                  </p:iterate>
+                                  <p:childTnLst>
+                                    <p:set>
+                                      <p:cBhvr>
+                                        <p:cTn id="20" fill="hold"/>
+                                        <p:tgtEl>
+                                          <p:spTgt spid="227">
+                                            <p:txEl>
+                                              <p:pRg st="3" end="3"/>
+                                            </p:txEl>
+                                          </p:spTgt>
+                                        </p:tgtEl>
+                                        <p:attrNameLst>
+                                          <p:attrName>style.visibility</p:attrName>
+                                        </p:attrNameLst>
+                                      </p:cBhvr>
+                                      <p:to>
+                                        <p:strVal val="visible"/>
+                                      </p:to>
+                                    </p:set>
+                                  </p:childTnLst>
+                                </p:cTn>
+                              </p:par>
+                            </p:childTnLst>
+                          </p:cTn>
+                        </p:par>
+                      </p:childTnLst>
+                    </p:cTn>
+                  </p:par>
+                  <p:par>
+                    <p:cTn id="21" fill="hold">
+                      <p:stCondLst>
+                        <p:cond delay="indefinite"/>
+                      </p:stCondLst>
+                      <p:childTnLst>
+                        <p:par>
+                          <p:cTn id="22" fill="hold">
+                            <p:stCondLst>
+                              <p:cond delay="0"/>
+                            </p:stCondLst>
+                            <p:childTnLst>
+                              <p:par>
+                                <p:cTn id="23" presetClass="entr" nodeType="clickEffect" presetSubtype="0" presetID="1" grpId="1" fill="hold">
+                                  <p:stCondLst>
+                                    <p:cond delay="0"/>
+                                  </p:stCondLst>
+                                  <p:iterate type="el" backwards="0">
+                                    <p:tmAbs val="0"/>
+                                  </p:iterate>
+                                  <p:childTnLst>
+                                    <p:set>
+                                      <p:cBhvr>
+                                        <p:cTn id="24" fill="hold"/>
+                                        <p:tgtEl>
+                                          <p:spTgt spid="227">
+                                            <p:txEl>
+                                              <p:pRg st="4" end="4"/>
+                                            </p:txEl>
+                                          </p:spTgt>
+                                        </p:tgtEl>
+                                        <p:attrNameLst>
+                                          <p:attrName>style.visibility</p:attrName>
+                                        </p:attrNameLst>
+                                      </p:cBhvr>
+                                      <p:to>
+                                        <p:strVal val="visible"/>
+                                      </p:to>
+                                    </p:set>
+                                  </p:childTnLst>
+                                </p:cTn>
+                              </p:par>
+                            </p:childTnLst>
+                          </p:cTn>
+                        </p:par>
+                      </p:childTnLst>
+                    </p:cTn>
+                  </p:par>
+                  <p:par>
+                    <p:cTn id="25" fill="hold">
+                      <p:stCondLst>
+                        <p:cond delay="indefinite"/>
+                      </p:stCondLst>
+                      <p:childTnLst>
+                        <p:par>
+                          <p:cTn id="26" fill="hold">
+                            <p:stCondLst>
+                              <p:cond delay="0"/>
+                            </p:stCondLst>
+                            <p:childTnLst>
+                              <p:par>
+                                <p:cTn id="27" presetClass="entr" nodeType="clickEffect" presetSubtype="0" presetID="1" grpId="1" fill="hold">
+                                  <p:stCondLst>
+                                    <p:cond delay="0"/>
+                                  </p:stCondLst>
+                                  <p:iterate type="el" backwards="0">
+                                    <p:tmAbs val="0"/>
+                                  </p:iterate>
+                                  <p:childTnLst>
+                                    <p:set>
+                                      <p:cBhvr>
+                                        <p:cTn id="28" fill="hold"/>
+                                        <p:tgtEl>
+                                          <p:spTgt spid="227">
+                                            <p:txEl>
+                                              <p:pRg st="5" end="5"/>
+                                            </p:txEl>
+                                          </p:spTgt>
+                                        </p:tgtEl>
+                                        <p:attrNameLst>
+                                          <p:attrName>style.visibility</p:attrName>
+                                        </p:attrNameLst>
+                                      </p:cBhvr>
+                                      <p:to>
+                                        <p:strVal val="visible"/>
+                                      </p:to>
+                                    </p:set>
+                                  </p:childTnLst>
+                                </p:cTn>
+                              </p:par>
+                            </p:childTnLst>
+                          </p:cTn>
+                        </p:par>
+                      </p:childTnLst>
+                    </p:cTn>
+                  </p:par>
+                  <p:par>
+                    <p:cTn id="29" fill="hold">
+                      <p:stCondLst>
+                        <p:cond delay="indefinite"/>
+                      </p:stCondLst>
+                      <p:childTnLst>
+                        <p:par>
+                          <p:cTn id="30" fill="hold">
+                            <p:stCondLst>
+                              <p:cond delay="0"/>
+                            </p:stCondLst>
+                            <p:childTnLst>
+                              <p:par>
+                                <p:cTn id="31" presetClass="entr" nodeType="clickEffect" presetSubtype="0" presetID="1" grpId="1" fill="hold">
+                                  <p:stCondLst>
+                                    <p:cond delay="0"/>
+                                  </p:stCondLst>
+                                  <p:iterate type="el" backwards="0">
+                                    <p:tmAbs val="0"/>
+                                  </p:iterate>
+                                  <p:childTnLst>
+                                    <p:set>
+                                      <p:cBhvr>
+                                        <p:cTn id="32" fill="hold"/>
+                                        <p:tgtEl>
+                                          <p:spTgt spid="227">
+                                            <p:txEl>
+                                              <p:pRg st="6" end="6"/>
+                                            </p:txEl>
+                                          </p:spTgt>
+                                        </p:tgtEl>
+                                        <p:attrNameLst>
+                                          <p:attrName>style.visibility</p:attrName>
+                                        </p:attrNameLst>
+                                      </p:cBhvr>
+                                      <p:to>
+                                        <p:strVal val="visible"/>
+                                      </p:to>
+                                    </p:set>
+                                  </p:childTnLst>
+                                </p:cTn>
+                              </p:par>
+                            </p:childTnLst>
+                          </p:cTn>
+                        </p:par>
+                      </p:childTnLst>
+                    </p:cTn>
+                  </p:par>
+                  <p:par>
+                    <p:cTn id="33" fill="hold">
+                      <p:stCondLst>
+                        <p:cond delay="indefinite"/>
+                      </p:stCondLst>
+                      <p:childTnLst>
+                        <p:par>
+                          <p:cTn id="34" fill="hold">
+                            <p:stCondLst>
+                              <p:cond delay="0"/>
+                            </p:stCondLst>
+                            <p:childTnLst>
+                              <p:par>
+                                <p:cTn id="35" presetClass="entr" nodeType="clickEffect" presetSubtype="0" presetID="1" grpId="1" fill="hold">
+                                  <p:stCondLst>
+                                    <p:cond delay="0"/>
+                                  </p:stCondLst>
+                                  <p:iterate type="el" backwards="0">
+                                    <p:tmAbs val="0"/>
+                                  </p:iterate>
+                                  <p:childTnLst>
+                                    <p:set>
+                                      <p:cBhvr>
+                                        <p:cTn id="36" fill="hold"/>
+                                        <p:tgtEl>
+                                          <p:spTgt spid="227">
+                                            <p:txEl>
+                                              <p:pRg st="7" end="7"/>
+                                            </p:txEl>
+                                          </p:spTgt>
+                                        </p:tgtEl>
+                                        <p:attrNameLst>
+                                          <p:attrName>style.visibility</p:attrName>
+                                        </p:attrNameLst>
+                                      </p:cBhvr>
+                                      <p:to>
+                                        <p:strVal val="visible"/>
+                                      </p:to>
+                                    </p:set>
+                                  </p:childTnLst>
+                                </p:cTn>
+                              </p:par>
+                            </p:childTnLst>
+                          </p:cTn>
+                        </p:par>
+                      </p:childTnLst>
+                    </p:cTn>
+                  </p:par>
+                  <p:par>
+                    <p:cTn id="37" fill="hold">
+                      <p:stCondLst>
+                        <p:cond delay="indefinite"/>
+                      </p:stCondLst>
+                      <p:childTnLst>
+                        <p:par>
+                          <p:cTn id="38" fill="hold">
+                            <p:stCondLst>
+                              <p:cond delay="0"/>
+                            </p:stCondLst>
+                            <p:childTnLst>
+                              <p:par>
+                                <p:cTn id="39" presetClass="entr" nodeType="clickEffect" presetSubtype="0" presetID="1" grpId="1" fill="hold">
+                                  <p:stCondLst>
+                                    <p:cond delay="0"/>
+                                  </p:stCondLst>
+                                  <p:iterate type="el" backwards="0">
+                                    <p:tmAbs val="0"/>
+                                  </p:iterate>
+                                  <p:childTnLst>
+                                    <p:set>
+                                      <p:cBhvr>
+                                        <p:cTn id="40" fill="hold"/>
+                                        <p:tgtEl>
+                                          <p:spTgt spid="227">
+                                            <p:txEl>
+                                              <p:pRg st="8" end="8"/>
+                                            </p:txEl>
+                                          </p:spTgt>
+                                        </p:tgtEl>
+                                        <p:attrNameLst>
+                                          <p:attrName>style.visibility</p:attrName>
+                                        </p:attrNameLst>
+                                      </p:cBhvr>
+                                      <p:to>
+                                        <p:strVal val="visible"/>
+                                      </p:to>
+                                    </p:set>
+                                  </p:childTnLst>
+                                </p:cTn>
+                              </p:par>
+                            </p:childTnLst>
+                          </p:cTn>
+                        </p:par>
+                      </p:childTnLst>
+                    </p:cTn>
+                  </p:par>
+                  <p:par>
+                    <p:cTn id="41" fill="hold">
+                      <p:stCondLst>
+                        <p:cond delay="indefinite"/>
+                      </p:stCondLst>
+                      <p:childTnLst>
+                        <p:par>
+                          <p:cTn id="42" fill="hold">
+                            <p:stCondLst>
+                              <p:cond delay="0"/>
+                            </p:stCondLst>
+                            <p:childTnLst>
+                              <p:par>
+                                <p:cTn id="43" presetClass="entr" nodeType="clickEffect" presetSubtype="0" presetID="1" grpId="1" fill="hold">
+                                  <p:stCondLst>
+                                    <p:cond delay="0"/>
+                                  </p:stCondLst>
+                                  <p:iterate type="el" backwards="0">
+                                    <p:tmAbs val="0"/>
+                                  </p:iterate>
+                                  <p:childTnLst>
+                                    <p:set>
+                                      <p:cBhvr>
+                                        <p:cTn id="44" fill="hold"/>
+                                        <p:tgtEl>
+                                          <p:spTgt spid="227">
+                                            <p:txEl>
+                                              <p:pRg st="9" end="9"/>
+                                            </p:txEl>
+                                          </p:spTgt>
+                                        </p:tgtEl>
+                                        <p:attrNameLst>
+                                          <p:attrName>style.visibility</p:attrName>
+                                        </p:attrNameLst>
+                                      </p:cBhvr>
+                                      <p:to>
+                                        <p:strVal val="visible"/>
+                                      </p:to>
+                                    </p:set>
+                                  </p:childTnLst>
+                                </p:cTn>
+                              </p:par>
+                            </p:childTnLst>
+                          </p:cTn>
+                        </p:par>
+                      </p:childTnLst>
+                    </p:cTn>
+                  </p:par>
                 </p:childTnLst>
               </p:cTn>
               <p:prevCondLst>
@@ -7409,7 +7249,7 @@
       </p:grpSpPr>
       <p:sp>
         <p:nvSpPr>
-          <p:cNvPr id="232" name="Dijkstra vs Prim Algo"/>
+          <p:cNvPr id="232" name="Questions"/>
           <p:cNvSpPr txBox="1"/>
           <p:nvPr>
             <p:ph type="title"/>
@@ -7426,24 +7266,20 @@
           <a:p>
             <a:pPr/>
             <a:r>
-              <a:t>Dijkstra vs Prim Algo</a:t>
+              <a:t>Questions</a:t>
             </a:r>
           </a:p>
         </p:txBody>
       </p:sp>
       <p:sp>
         <p:nvSpPr>
-          <p:cNvPr id="233" name="Do both gave same tree? Consider the example"/>
+          <p:cNvPr id="233" name="Q4: Solve the single-source shortest-path problem in a graph with non-negative numbers assigned to its vertices (and the length of a path defined as the sum of the vertex numbers on the path).…"/>
           <p:cNvSpPr txBox="1"/>
           <p:nvPr>
-            <p:ph type="body" sz="quarter" idx="1"/>
+            <p:ph type="body" idx="1"/>
           </p:nvPr>
         </p:nvSpPr>
         <p:spPr>
-          <a:xfrm>
-            <a:off x="666288" y="938113"/>
-            <a:ext cx="9055611" cy="617135"/>
-          </a:xfrm>
           <a:prstGeom prst="rect">
             <a:avLst/>
           </a:prstGeom>
@@ -7452,9 +7288,26 @@
           <a:bodyPr/>
           <a:lstStyle/>
           <a:p>
-            <a:pPr/>
-            <a:r>
-              <a:t>Do both gave same tree? Consider the example</a:t>
+            <a:pPr marL="350440" indent="-310753"/>
+            <a:r>
+              <a:rPr sz="2900"/>
+              <a:t>Q4: Solve the single-source shortest-path problem in a graph with non-negative numbers assigned to its vertices (and the length of a path defined as the sum of the vertex numbers on the path).</a:t>
+            </a:r>
+            <a:endParaRPr sz="2900"/>
+          </a:p>
+          <a:p>
+            <a:pPr marL="350440" indent="-310753"/>
+            <a:r>
+              <a:rPr sz="2900"/>
+              <a:t>Hint: </a:t>
+            </a:r>
+            <a:endParaRPr sz="2900"/>
+          </a:p>
+          <a:p>
+            <a:pPr lvl="1" marL="671512" indent="-276225"/>
+            <a:r>
+              <a:rPr sz="2900"/>
+              <a:t>The weight of the edge is sum of non-negative numbers assigned to vertices of the corresponding edge.</a:t>
             </a:r>
           </a:p>
         </p:txBody>
@@ -7566,9 +7419,399 @@
           </a:p>
         </p:txBody>
       </p:sp>
+    </p:spTree>
+  </p:cSld>
+  <p:clrMapOvr>
+    <a:masterClrMapping/>
+  </p:clrMapOvr>
+  <p:transition xmlns:p14="http://schemas.microsoft.com/office/powerpoint/2010/main" spd="med" advClick="1"/>
+  <p:timing>
+    <p:tnLst>
+      <p:par>
+        <p:cTn id="1" nodeType="tmRoot" restart="never" dur="indefinite" fill="hold">
+          <p:childTnLst>
+            <p:seq concurrent="1" prevAc="none" nextAc="seek">
+              <p:cTn id="2" nodeType="mainSeq" dur="indefinite" fill="hold">
+                <p:childTnLst>
+                  <p:par>
+                    <p:cTn id="3" fill="hold">
+                      <p:stCondLst>
+                        <p:cond delay="indefinite"/>
+                      </p:stCondLst>
+                      <p:childTnLst>
+                        <p:par>
+                          <p:cTn id="4" fill="hold">
+                            <p:stCondLst>
+                              <p:cond delay="0"/>
+                            </p:stCondLst>
+                            <p:childTnLst>
+                              <p:par>
+                                <p:cTn id="5" presetClass="entr" nodeType="clickEffect" presetSubtype="0" presetID="1" grpId="1" fill="hold">
+                                  <p:stCondLst>
+                                    <p:cond delay="0"/>
+                                  </p:stCondLst>
+                                  <p:iterate type="el" backwards="0">
+                                    <p:tmAbs val="0"/>
+                                  </p:iterate>
+                                  <p:childTnLst>
+                                    <p:set>
+                                      <p:cBhvr>
+                                        <p:cTn id="6" fill="hold"/>
+                                        <p:tgtEl>
+                                          <p:spTgt spid="233">
+                                            <p:bg/>
+                                          </p:spTgt>
+                                        </p:tgtEl>
+                                        <p:attrNameLst>
+                                          <p:attrName>style.visibility</p:attrName>
+                                        </p:attrNameLst>
+                                      </p:cBhvr>
+                                      <p:to>
+                                        <p:strVal val="visible"/>
+                                      </p:to>
+                                    </p:set>
+                                  </p:childTnLst>
+                                </p:cTn>
+                              </p:par>
+                              <p:par>
+                                <p:cTn id="7" presetClass="entr" nodeType="withEffect" presetSubtype="0" presetID="1" grpId="1" fill="hold">
+                                  <p:stCondLst>
+                                    <p:cond delay="0"/>
+                                  </p:stCondLst>
+                                  <p:iterate type="el" backwards="0">
+                                    <p:tmAbs val="0"/>
+                                  </p:iterate>
+                                  <p:childTnLst>
+                                    <p:set>
+                                      <p:cBhvr>
+                                        <p:cTn id="8" fill="hold"/>
+                                        <p:tgtEl>
+                                          <p:spTgt spid="233">
+                                            <p:txEl>
+                                              <p:pRg st="0" end="0"/>
+                                            </p:txEl>
+                                          </p:spTgt>
+                                        </p:tgtEl>
+                                        <p:attrNameLst>
+                                          <p:attrName>style.visibility</p:attrName>
+                                        </p:attrNameLst>
+                                      </p:cBhvr>
+                                      <p:to>
+                                        <p:strVal val="visible"/>
+                                      </p:to>
+                                    </p:set>
+                                  </p:childTnLst>
+                                </p:cTn>
+                              </p:par>
+                            </p:childTnLst>
+                          </p:cTn>
+                        </p:par>
+                      </p:childTnLst>
+                    </p:cTn>
+                  </p:par>
+                  <p:par>
+                    <p:cTn id="9" fill="hold">
+                      <p:stCondLst>
+                        <p:cond delay="indefinite"/>
+                      </p:stCondLst>
+                      <p:childTnLst>
+                        <p:par>
+                          <p:cTn id="10" fill="hold">
+                            <p:stCondLst>
+                              <p:cond delay="0"/>
+                            </p:stCondLst>
+                            <p:childTnLst>
+                              <p:par>
+                                <p:cTn id="11" presetClass="entr" nodeType="clickEffect" presetSubtype="0" presetID="1" grpId="1" fill="hold">
+                                  <p:stCondLst>
+                                    <p:cond delay="0"/>
+                                  </p:stCondLst>
+                                  <p:iterate type="el" backwards="0">
+                                    <p:tmAbs val="0"/>
+                                  </p:iterate>
+                                  <p:childTnLst>
+                                    <p:set>
+                                      <p:cBhvr>
+                                        <p:cTn id="12" fill="hold"/>
+                                        <p:tgtEl>
+                                          <p:spTgt spid="233">
+                                            <p:txEl>
+                                              <p:pRg st="1" end="1"/>
+                                            </p:txEl>
+                                          </p:spTgt>
+                                        </p:tgtEl>
+                                        <p:attrNameLst>
+                                          <p:attrName>style.visibility</p:attrName>
+                                        </p:attrNameLst>
+                                      </p:cBhvr>
+                                      <p:to>
+                                        <p:strVal val="visible"/>
+                                      </p:to>
+                                    </p:set>
+                                  </p:childTnLst>
+                                </p:cTn>
+                              </p:par>
+                            </p:childTnLst>
+                          </p:cTn>
+                        </p:par>
+                      </p:childTnLst>
+                    </p:cTn>
+                  </p:par>
+                  <p:par>
+                    <p:cTn id="13" fill="hold">
+                      <p:stCondLst>
+                        <p:cond delay="indefinite"/>
+                      </p:stCondLst>
+                      <p:childTnLst>
+                        <p:par>
+                          <p:cTn id="14" fill="hold">
+                            <p:stCondLst>
+                              <p:cond delay="0"/>
+                            </p:stCondLst>
+                            <p:childTnLst>
+                              <p:par>
+                                <p:cTn id="15" presetClass="entr" nodeType="clickEffect" presetSubtype="0" presetID="1" grpId="1" fill="hold">
+                                  <p:stCondLst>
+                                    <p:cond delay="0"/>
+                                  </p:stCondLst>
+                                  <p:iterate type="el" backwards="0">
+                                    <p:tmAbs val="0"/>
+                                  </p:iterate>
+                                  <p:childTnLst>
+                                    <p:set>
+                                      <p:cBhvr>
+                                        <p:cTn id="16" fill="hold"/>
+                                        <p:tgtEl>
+                                          <p:spTgt spid="233">
+                                            <p:txEl>
+                                              <p:pRg st="2" end="2"/>
+                                            </p:txEl>
+                                          </p:spTgt>
+                                        </p:tgtEl>
+                                        <p:attrNameLst>
+                                          <p:attrName>style.visibility</p:attrName>
+                                        </p:attrNameLst>
+                                      </p:cBhvr>
+                                      <p:to>
+                                        <p:strVal val="visible"/>
+                                      </p:to>
+                                    </p:set>
+                                  </p:childTnLst>
+                                </p:cTn>
+                              </p:par>
+                            </p:childTnLst>
+                          </p:cTn>
+                        </p:par>
+                      </p:childTnLst>
+                    </p:cTn>
+                  </p:par>
+                </p:childTnLst>
+              </p:cTn>
+              <p:prevCondLst>
+                <p:cond evt="onPrev">
+                  <p:tgtEl>
+                    <p:sldTgt/>
+                  </p:tgtEl>
+                </p:cond>
+              </p:prevCondLst>
+              <p:nextCondLst>
+                <p:cond evt="onNext">
+                  <p:tgtEl>
+                    <p:sldTgt/>
+                  </p:tgtEl>
+                </p:cond>
+              </p:nextCondLst>
+            </p:seq>
+          </p:childTnLst>
+        </p:cTn>
+      </p:par>
+    </p:tnLst>
+    <p:bldLst>
+      <p:bldP build="p" bldLvl="5" animBg="1" rev="0" advAuto="0" spid="233" grpId="1"/>
+    </p:bldLst>
+  </p:timing>
+</p:sld>
+</file>
+
+<file path=ppt/slides/slide18.xml><?xml version="1.0" encoding="utf-8"?>
+<p:sld xmlns:a="http://schemas.openxmlformats.org/drawingml/2006/main" xmlns:r="http://schemas.openxmlformats.org/officeDocument/2006/relationships" xmlns:p="http://schemas.openxmlformats.org/presentationml/2006/main" xmlns:m="http://schemas.openxmlformats.org/officeDocument/2006/math" xmlns:a14="http://schemas.microsoft.com/office/drawing/2010/main" showMasterSp="1" showMasterPhAnim="1">
+  <p:cSld>
+    <p:spTree>
+      <p:nvGrpSpPr>
+        <p:cNvPr id="1" name=""/>
+        <p:cNvGrpSpPr/>
+        <p:nvPr/>
+      </p:nvGrpSpPr>
+      <p:grpSpPr>
+        <a:xfrm>
+          <a:off x="0" y="0"/>
+          <a:ext cx="0" cy="0"/>
+          <a:chOff x="0" y="0"/>
+          <a:chExt cx="0" cy="0"/>
+        </a:xfrm>
+      </p:grpSpPr>
+      <p:sp>
+        <p:nvSpPr>
+          <p:cNvPr id="238" name="Dijkstra vs Prim Algo"/>
+          <p:cNvSpPr txBox="1"/>
+          <p:nvPr>
+            <p:ph type="title"/>
+          </p:nvPr>
+        </p:nvSpPr>
+        <p:spPr>
+          <a:prstGeom prst="rect">
+            <a:avLst/>
+          </a:prstGeom>
+        </p:spPr>
+        <p:txBody>
+          <a:bodyPr/>
+          <a:lstStyle/>
+          <a:p>
+            <a:pPr/>
+            <a:r>
+              <a:t>Dijkstra vs Prim Algo</a:t>
+            </a:r>
+          </a:p>
+        </p:txBody>
+      </p:sp>
+      <p:sp>
+        <p:nvSpPr>
+          <p:cNvPr id="239" name="Do both gave same tree? Consider the example"/>
+          <p:cNvSpPr txBox="1"/>
+          <p:nvPr>
+            <p:ph type="body" sz="quarter" idx="1"/>
+          </p:nvPr>
+        </p:nvSpPr>
+        <p:spPr>
+          <a:xfrm>
+            <a:off x="666288" y="938113"/>
+            <a:ext cx="9055611" cy="617135"/>
+          </a:xfrm>
+          <a:prstGeom prst="rect">
+            <a:avLst/>
+          </a:prstGeom>
+        </p:spPr>
+        <p:txBody>
+          <a:bodyPr/>
+          <a:lstStyle/>
+          <a:p>
+            <a:pPr/>
+            <a:r>
+              <a:t>Do both gave same tree? Consider the example</a:t>
+            </a:r>
+          </a:p>
+        </p:txBody>
+      </p:sp>
+      <p:sp>
+        <p:nvSpPr>
+          <p:cNvPr id="240" name="Slide Number"/>
+          <p:cNvSpPr txBox="1"/>
+          <p:nvPr>
+            <p:ph type="sldNum" sz="quarter" idx="2"/>
+          </p:nvPr>
+        </p:nvSpPr>
+        <p:spPr>
+          <a:prstGeom prst="rect">
+            <a:avLst/>
+          </a:prstGeom>
+          <a:extLst>
+            <a:ext uri="{C572A759-6A51-4108-AA02-DFA0A04FC94B}">
+              <ma14:wrappingTextBoxFlag xmlns:ma14="http://schemas.microsoft.com/office/mac/drawingml/2011/main" val="1"/>
+            </a:ext>
+          </a:extLst>
+        </p:spPr>
+        <p:txBody>
+          <a:bodyPr/>
+          <a:lstStyle/>
+          <a:p>
+            <a:pPr/>
+            <a:fld id="{86CB4B4D-7CA3-9044-876B-883B54F8677D}" type="slidenum"/>
+          </a:p>
+        </p:txBody>
+      </p:sp>
+      <p:sp>
+        <p:nvSpPr>
+          <p:cNvPr id="241" name="DAA/Greedy Algorithms"/>
+          <p:cNvSpPr txBox="1"/>
+          <p:nvPr/>
+        </p:nvSpPr>
+        <p:spPr>
+          <a:xfrm>
+            <a:off x="423212" y="6963885"/>
+            <a:ext cx="3244911" cy="431552"/>
+          </a:xfrm>
+          <a:prstGeom prst="rect">
+            <a:avLst/>
+          </a:prstGeom>
+          <a:ln w="12700">
+            <a:miter lim="400000"/>
+          </a:ln>
+          <a:extLst>
+            <a:ext uri="{C572A759-6A51-4108-AA02-DFA0A04FC94B}">
+              <ma14:wrappingTextBoxFlag xmlns:ma14="http://schemas.microsoft.com/office/mac/drawingml/2011/main" val="1"/>
+            </a:ext>
+          </a:extLst>
+        </p:spPr>
+        <p:txBody>
+          <a:bodyPr wrap="none" lIns="50800" tIns="50800" rIns="50800" bIns="50800" anchor="ctr">
+            <a:spAutoFit/>
+          </a:bodyPr>
+          <a:lstStyle>
+            <a:lvl1pPr>
+              <a:defRPr sz="2400"/>
+            </a:lvl1pPr>
+          </a:lstStyle>
+          <a:p>
+            <a:pPr/>
+            <a:r>
+              <a:t>DAA/Greedy Algorithms</a:t>
+            </a:r>
+          </a:p>
+        </p:txBody>
+      </p:sp>
+      <p:sp>
+        <p:nvSpPr>
+          <p:cNvPr id="242" name="RPR/"/>
+          <p:cNvSpPr txBox="1"/>
+          <p:nvPr/>
+        </p:nvSpPr>
+        <p:spPr>
+          <a:xfrm>
+            <a:off x="7535212" y="6988206"/>
+            <a:ext cx="705605" cy="382910"/>
+          </a:xfrm>
+          <a:prstGeom prst="rect">
+            <a:avLst/>
+          </a:prstGeom>
+          <a:ln w="12700">
+            <a:miter lim="400000"/>
+          </a:ln>
+          <a:extLst>
+            <a:ext uri="{C572A759-6A51-4108-AA02-DFA0A04FC94B}">
+              <ma14:wrappingTextBoxFlag xmlns:ma14="http://schemas.microsoft.com/office/mac/drawingml/2011/main" val="1"/>
+            </a:ext>
+          </a:extLst>
+        </p:spPr>
+        <p:txBody>
+          <a:bodyPr wrap="none" lIns="50800" tIns="50800" rIns="50800" bIns="50800" anchor="ctr">
+            <a:spAutoFit/>
+          </a:bodyPr>
+          <a:lstStyle>
+            <a:lvl1pPr>
+              <a:defRPr sz="2000"/>
+            </a:lvl1pPr>
+          </a:lstStyle>
+          <a:p>
+            <a:pPr/>
+            <a:r>
+              <a:t>RPR/</a:t>
+            </a:r>
+          </a:p>
+        </p:txBody>
+      </p:sp>
       <p:grpSp>
         <p:nvGrpSpPr>
-          <p:cNvPr id="269" name="Group"/>
+          <p:cNvPr id="275" name="Group"/>
           <p:cNvGrpSpPr/>
           <p:nvPr/>
         </p:nvGrpSpPr>
@@ -7582,7 +7825,7 @@
         </p:grpSpPr>
         <p:sp>
           <p:nvSpPr>
-            <p:cNvPr id="237" name="a"/>
+            <p:cNvPr id="243" name="a"/>
             <p:cNvSpPr/>
             <p:nvPr/>
           </p:nvSpPr>
@@ -7633,7 +7876,7 @@
         </p:sp>
         <p:sp>
           <p:nvSpPr>
-            <p:cNvPr id="238" name="d"/>
+            <p:cNvPr id="244" name="d"/>
             <p:cNvSpPr/>
             <p:nvPr/>
           </p:nvSpPr>
@@ -7684,7 +7927,7 @@
         </p:sp>
         <p:sp>
           <p:nvSpPr>
-            <p:cNvPr id="239" name="e"/>
+            <p:cNvPr id="245" name="e"/>
             <p:cNvSpPr/>
             <p:nvPr/>
           </p:nvSpPr>
@@ -7735,7 +7978,7 @@
         </p:sp>
         <p:sp>
           <p:nvSpPr>
-            <p:cNvPr id="240" name="b"/>
+            <p:cNvPr id="246" name="b"/>
             <p:cNvSpPr/>
             <p:nvPr/>
           </p:nvSpPr>
@@ -7786,7 +8029,7 @@
         </p:sp>
         <p:sp>
           <p:nvSpPr>
-            <p:cNvPr id="241" name="f"/>
+            <p:cNvPr id="247" name="f"/>
             <p:cNvSpPr/>
             <p:nvPr/>
           </p:nvSpPr>
@@ -7837,7 +8080,7 @@
         </p:sp>
         <p:sp>
           <p:nvSpPr>
-            <p:cNvPr id="242" name="c"/>
+            <p:cNvPr id="248" name="c"/>
             <p:cNvSpPr/>
             <p:nvPr/>
           </p:nvSpPr>
@@ -7888,7 +8131,7 @@
         </p:sp>
         <p:sp>
           <p:nvSpPr>
-            <p:cNvPr id="243" name="Line"/>
+            <p:cNvPr id="249" name="Line"/>
             <p:cNvSpPr/>
             <p:nvPr/>
           </p:nvSpPr>
@@ -7922,7 +8165,7 @@
         </p:sp>
         <p:sp>
           <p:nvSpPr>
-            <p:cNvPr id="244" name="Line"/>
+            <p:cNvPr id="250" name="Line"/>
             <p:cNvSpPr/>
             <p:nvPr/>
           </p:nvSpPr>
@@ -7956,7 +8199,7 @@
         </p:sp>
         <p:sp>
           <p:nvSpPr>
-            <p:cNvPr id="245" name="Line"/>
+            <p:cNvPr id="251" name="Line"/>
             <p:cNvSpPr/>
             <p:nvPr/>
           </p:nvSpPr>
@@ -7990,7 +8233,7 @@
         </p:sp>
         <p:sp>
           <p:nvSpPr>
-            <p:cNvPr id="246" name="Line"/>
+            <p:cNvPr id="252" name="Line"/>
             <p:cNvSpPr/>
             <p:nvPr/>
           </p:nvSpPr>
@@ -8024,7 +8267,7 @@
         </p:sp>
         <p:sp>
           <p:nvSpPr>
-            <p:cNvPr id="247" name="Line"/>
+            <p:cNvPr id="253" name="Line"/>
             <p:cNvSpPr/>
             <p:nvPr/>
           </p:nvSpPr>
@@ -8058,7 +8301,7 @@
         </p:sp>
         <p:sp>
           <p:nvSpPr>
-            <p:cNvPr id="248" name="Line"/>
+            <p:cNvPr id="254" name="Line"/>
             <p:cNvSpPr/>
             <p:nvPr/>
           </p:nvSpPr>
@@ -8092,7 +8335,7 @@
         </p:sp>
         <p:sp>
           <p:nvSpPr>
-            <p:cNvPr id="249" name="Line"/>
+            <p:cNvPr id="255" name="Line"/>
             <p:cNvSpPr/>
             <p:nvPr/>
           </p:nvSpPr>
@@ -8126,7 +8369,7 @@
         </p:sp>
         <p:sp>
           <p:nvSpPr>
-            <p:cNvPr id="250" name="Line"/>
+            <p:cNvPr id="256" name="Line"/>
             <p:cNvSpPr/>
             <p:nvPr/>
           </p:nvSpPr>
@@ -8160,7 +8403,7 @@
         </p:sp>
         <p:sp>
           <p:nvSpPr>
-            <p:cNvPr id="251" name="Line"/>
+            <p:cNvPr id="257" name="Line"/>
             <p:cNvSpPr/>
             <p:nvPr/>
           </p:nvSpPr>
@@ -8194,7 +8437,7 @@
         </p:sp>
         <p:sp>
           <p:nvSpPr>
-            <p:cNvPr id="252" name="Line"/>
+            <p:cNvPr id="258" name="Line"/>
             <p:cNvSpPr/>
             <p:nvPr/>
           </p:nvSpPr>
@@ -8228,7 +8471,7 @@
         </p:sp>
         <p:sp>
           <p:nvSpPr>
-            <p:cNvPr id="253" name="2"/>
+            <p:cNvPr id="259" name="2"/>
             <p:cNvSpPr txBox="1"/>
             <p:nvPr/>
           </p:nvSpPr>
@@ -8276,7 +8519,7 @@
         </p:sp>
         <p:sp>
           <p:nvSpPr>
-            <p:cNvPr id="254" name="6"/>
+            <p:cNvPr id="260" name="6"/>
             <p:cNvSpPr txBox="1"/>
             <p:nvPr/>
           </p:nvSpPr>
@@ -8324,7 +8567,7 @@
         </p:sp>
         <p:sp>
           <p:nvSpPr>
-            <p:cNvPr id="255" name="3"/>
+            <p:cNvPr id="261" name="3"/>
             <p:cNvSpPr txBox="1"/>
             <p:nvPr/>
           </p:nvSpPr>
@@ -8372,7 +8615,7 @@
         </p:sp>
         <p:sp>
           <p:nvSpPr>
-            <p:cNvPr id="256" name="5"/>
+            <p:cNvPr id="262" name="5"/>
             <p:cNvSpPr txBox="1"/>
             <p:nvPr/>
           </p:nvSpPr>
@@ -8420,7 +8663,7 @@
         </p:sp>
         <p:sp>
           <p:nvSpPr>
-            <p:cNvPr id="257" name="1"/>
+            <p:cNvPr id="263" name="1"/>
             <p:cNvSpPr txBox="1"/>
             <p:nvPr/>
           </p:nvSpPr>
@@ -8468,7 +8711,7 @@
         </p:sp>
         <p:sp>
           <p:nvSpPr>
-            <p:cNvPr id="258" name="4"/>
+            <p:cNvPr id="264" name="4"/>
             <p:cNvSpPr txBox="1"/>
             <p:nvPr/>
           </p:nvSpPr>
@@ -8516,7 +8759,7 @@
         </p:sp>
         <p:sp>
           <p:nvSpPr>
-            <p:cNvPr id="259" name="4"/>
+            <p:cNvPr id="265" name="4"/>
             <p:cNvSpPr txBox="1"/>
             <p:nvPr/>
           </p:nvSpPr>
@@ -8564,7 +8807,7 @@
         </p:sp>
         <p:sp>
           <p:nvSpPr>
-            <p:cNvPr id="260" name="5"/>
+            <p:cNvPr id="266" name="5"/>
             <p:cNvSpPr txBox="1"/>
             <p:nvPr/>
           </p:nvSpPr>
@@ -8612,7 +8855,7 @@
         </p:sp>
         <p:sp>
           <p:nvSpPr>
-            <p:cNvPr id="261" name="6"/>
+            <p:cNvPr id="267" name="6"/>
             <p:cNvSpPr txBox="1"/>
             <p:nvPr/>
           </p:nvSpPr>
@@ -8660,7 +8903,7 @@
         </p:sp>
         <p:sp>
           <p:nvSpPr>
-            <p:cNvPr id="262" name="8"/>
+            <p:cNvPr id="268" name="8"/>
             <p:cNvSpPr txBox="1"/>
             <p:nvPr/>
           </p:nvSpPr>
@@ -8708,7 +8951,7 @@
         </p:sp>
         <p:sp>
           <p:nvSpPr>
-            <p:cNvPr id="263" name="a"/>
+            <p:cNvPr id="269" name="a"/>
             <p:cNvSpPr/>
             <p:nvPr/>
           </p:nvSpPr>
@@ -8759,7 +9002,7 @@
         </p:sp>
         <p:sp>
           <p:nvSpPr>
-            <p:cNvPr id="264" name="b"/>
+            <p:cNvPr id="270" name="b"/>
             <p:cNvSpPr/>
             <p:nvPr/>
           </p:nvSpPr>
@@ -8810,7 +9053,7 @@
         </p:sp>
         <p:sp>
           <p:nvSpPr>
-            <p:cNvPr id="265" name="c"/>
+            <p:cNvPr id="271" name="c"/>
             <p:cNvSpPr/>
             <p:nvPr/>
           </p:nvSpPr>
@@ -8861,7 +9104,7 @@
         </p:sp>
         <p:sp>
           <p:nvSpPr>
-            <p:cNvPr id="266" name="d"/>
+            <p:cNvPr id="272" name="d"/>
             <p:cNvSpPr/>
             <p:nvPr/>
           </p:nvSpPr>
@@ -8912,7 +9155,7 @@
         </p:sp>
         <p:sp>
           <p:nvSpPr>
-            <p:cNvPr id="267" name="e"/>
+            <p:cNvPr id="273" name="e"/>
             <p:cNvSpPr/>
             <p:nvPr/>
           </p:nvSpPr>
@@ -8963,7 +9206,7 @@
         </p:sp>
         <p:sp>
           <p:nvSpPr>
-            <p:cNvPr id="268" name="f"/>
+            <p:cNvPr id="274" name="f"/>
             <p:cNvSpPr/>
             <p:nvPr/>
           </p:nvSpPr>
@@ -9015,7 +9258,7 @@
       </p:grpSp>
       <p:grpSp>
         <p:nvGrpSpPr>
-          <p:cNvPr id="303" name="Group"/>
+          <p:cNvPr id="309" name="Group"/>
           <p:cNvGrpSpPr/>
           <p:nvPr/>
         </p:nvGrpSpPr>
@@ -9029,7 +9272,7 @@
         </p:grpSpPr>
         <p:sp>
           <p:nvSpPr>
-            <p:cNvPr id="270" name="d"/>
+            <p:cNvPr id="276" name="d"/>
             <p:cNvSpPr/>
             <p:nvPr/>
           </p:nvSpPr>
@@ -9080,7 +9323,7 @@
         </p:sp>
         <p:grpSp>
           <p:nvGrpSpPr>
-            <p:cNvPr id="302" name="Group"/>
+            <p:cNvPr id="308" name="Group"/>
             <p:cNvGrpSpPr/>
             <p:nvPr/>
           </p:nvGrpSpPr>
@@ -9094,7 +9337,7 @@
           </p:grpSpPr>
           <p:sp>
             <p:nvSpPr>
-              <p:cNvPr id="271" name="a"/>
+              <p:cNvPr id="277" name="a"/>
               <p:cNvSpPr/>
               <p:nvPr/>
             </p:nvSpPr>
@@ -9145,7 +9388,7 @@
           </p:sp>
           <p:sp>
             <p:nvSpPr>
-              <p:cNvPr id="272" name="e"/>
+              <p:cNvPr id="278" name="e"/>
               <p:cNvSpPr/>
               <p:nvPr/>
             </p:nvSpPr>
@@ -9196,7 +9439,7 @@
           </p:sp>
           <p:sp>
             <p:nvSpPr>
-              <p:cNvPr id="273" name="b"/>
+              <p:cNvPr id="279" name="b"/>
               <p:cNvSpPr/>
               <p:nvPr/>
             </p:nvSpPr>
@@ -9247,7 +9490,7 @@
           </p:sp>
           <p:sp>
             <p:nvSpPr>
-              <p:cNvPr id="274" name="f"/>
+              <p:cNvPr id="280" name="f"/>
               <p:cNvSpPr/>
               <p:nvPr/>
             </p:nvSpPr>
@@ -9298,7 +9541,7 @@
           </p:sp>
           <p:sp>
             <p:nvSpPr>
-              <p:cNvPr id="275" name="c"/>
+              <p:cNvPr id="281" name="c"/>
               <p:cNvSpPr/>
               <p:nvPr/>
             </p:nvSpPr>
@@ -9349,7 +9592,7 @@
           </p:sp>
           <p:sp>
             <p:nvSpPr>
-              <p:cNvPr id="276" name="Line"/>
+              <p:cNvPr id="282" name="Line"/>
               <p:cNvSpPr/>
               <p:nvPr/>
             </p:nvSpPr>
@@ -9383,7 +9626,7 @@
           </p:sp>
           <p:sp>
             <p:nvSpPr>
-              <p:cNvPr id="277" name="Line"/>
+              <p:cNvPr id="283" name="Line"/>
               <p:cNvSpPr/>
               <p:nvPr/>
             </p:nvSpPr>
@@ -9419,7 +9662,7 @@
           </p:sp>
           <p:sp>
             <p:nvSpPr>
-              <p:cNvPr id="278" name="Line"/>
+              <p:cNvPr id="284" name="Line"/>
               <p:cNvSpPr/>
               <p:nvPr/>
             </p:nvSpPr>
@@ -9455,7 +9698,7 @@
           </p:sp>
           <p:sp>
             <p:nvSpPr>
-              <p:cNvPr id="279" name="Line"/>
+              <p:cNvPr id="285" name="Line"/>
               <p:cNvSpPr/>
               <p:nvPr/>
             </p:nvSpPr>
@@ -9491,7 +9734,7 @@
           </p:sp>
           <p:sp>
             <p:nvSpPr>
-              <p:cNvPr id="280" name="Line"/>
+              <p:cNvPr id="286" name="Line"/>
               <p:cNvSpPr/>
               <p:nvPr/>
             </p:nvSpPr>
@@ -9525,7 +9768,7 @@
           </p:sp>
           <p:sp>
             <p:nvSpPr>
-              <p:cNvPr id="281" name="Line"/>
+              <p:cNvPr id="287" name="Line"/>
               <p:cNvSpPr/>
               <p:nvPr/>
             </p:nvSpPr>
@@ -9561,7 +9804,7 @@
           </p:sp>
           <p:sp>
             <p:nvSpPr>
-              <p:cNvPr id="282" name="Line"/>
+              <p:cNvPr id="288" name="Line"/>
               <p:cNvSpPr/>
               <p:nvPr/>
             </p:nvSpPr>
@@ -9595,7 +9838,7 @@
           </p:sp>
           <p:sp>
             <p:nvSpPr>
-              <p:cNvPr id="283" name="Line"/>
+              <p:cNvPr id="289" name="Line"/>
               <p:cNvSpPr/>
               <p:nvPr/>
             </p:nvSpPr>
@@ -9631,7 +9874,7 @@
           </p:sp>
           <p:sp>
             <p:nvSpPr>
-              <p:cNvPr id="284" name="Line"/>
+              <p:cNvPr id="290" name="Line"/>
               <p:cNvSpPr/>
               <p:nvPr/>
             </p:nvSpPr>
@@ -9665,7 +9908,7 @@
           </p:sp>
           <p:sp>
             <p:nvSpPr>
-              <p:cNvPr id="285" name="Line"/>
+              <p:cNvPr id="291" name="Line"/>
               <p:cNvSpPr/>
               <p:nvPr/>
             </p:nvSpPr>
@@ -9699,7 +9942,7 @@
           </p:sp>
           <p:sp>
             <p:nvSpPr>
-              <p:cNvPr id="286" name="2"/>
+              <p:cNvPr id="292" name="2"/>
               <p:cNvSpPr txBox="1"/>
               <p:nvPr/>
             </p:nvSpPr>
@@ -9747,7 +9990,7 @@
           </p:sp>
           <p:sp>
             <p:nvSpPr>
-              <p:cNvPr id="287" name="6"/>
+              <p:cNvPr id="293" name="6"/>
               <p:cNvSpPr txBox="1"/>
               <p:nvPr/>
             </p:nvSpPr>
@@ -9798,7 +10041,7 @@
           </p:sp>
           <p:sp>
             <p:nvSpPr>
-              <p:cNvPr id="288" name="3"/>
+              <p:cNvPr id="294" name="3"/>
               <p:cNvSpPr txBox="1"/>
               <p:nvPr/>
             </p:nvSpPr>
@@ -9846,7 +10089,7 @@
           </p:sp>
           <p:sp>
             <p:nvSpPr>
-              <p:cNvPr id="289" name="5"/>
+              <p:cNvPr id="295" name="5"/>
               <p:cNvSpPr txBox="1"/>
               <p:nvPr/>
             </p:nvSpPr>
@@ -9897,7 +10140,7 @@
           </p:sp>
           <p:sp>
             <p:nvSpPr>
-              <p:cNvPr id="290" name="1"/>
+              <p:cNvPr id="296" name="1"/>
               <p:cNvSpPr txBox="1"/>
               <p:nvPr/>
             </p:nvSpPr>
@@ -9945,7 +10188,7 @@
           </p:sp>
           <p:sp>
             <p:nvSpPr>
-              <p:cNvPr id="291" name="4"/>
+              <p:cNvPr id="297" name="4"/>
               <p:cNvSpPr txBox="1"/>
               <p:nvPr/>
             </p:nvSpPr>
@@ -9993,7 +10236,7 @@
           </p:sp>
           <p:sp>
             <p:nvSpPr>
-              <p:cNvPr id="292" name="4"/>
+              <p:cNvPr id="298" name="4"/>
               <p:cNvSpPr txBox="1"/>
               <p:nvPr/>
             </p:nvSpPr>
@@ -10044,7 +10287,7 @@
           </p:sp>
           <p:sp>
             <p:nvSpPr>
-              <p:cNvPr id="293" name="5"/>
+              <p:cNvPr id="299" name="5"/>
               <p:cNvSpPr txBox="1"/>
               <p:nvPr/>
             </p:nvSpPr>
@@ -10092,7 +10335,7 @@
           </p:sp>
           <p:sp>
             <p:nvSpPr>
-              <p:cNvPr id="294" name="6"/>
+              <p:cNvPr id="300" name="6"/>
               <p:cNvSpPr txBox="1"/>
               <p:nvPr/>
             </p:nvSpPr>
@@ -10143,7 +10386,7 @@
           </p:sp>
           <p:sp>
             <p:nvSpPr>
-              <p:cNvPr id="295" name="8"/>
+              <p:cNvPr id="301" name="8"/>
               <p:cNvSpPr txBox="1"/>
               <p:nvPr/>
             </p:nvSpPr>
@@ -10194,7 +10437,7 @@
           </p:sp>
           <p:sp>
             <p:nvSpPr>
-              <p:cNvPr id="296" name="a"/>
+              <p:cNvPr id="302" name="a"/>
               <p:cNvSpPr/>
               <p:nvPr/>
             </p:nvSpPr>
@@ -10245,7 +10488,7 @@
           </p:sp>
           <p:sp>
             <p:nvSpPr>
-              <p:cNvPr id="297" name="b"/>
+              <p:cNvPr id="303" name="b"/>
               <p:cNvSpPr/>
               <p:nvPr/>
             </p:nvSpPr>
@@ -10296,7 +10539,7 @@
           </p:sp>
           <p:sp>
             <p:nvSpPr>
-              <p:cNvPr id="298" name="c"/>
+              <p:cNvPr id="304" name="c"/>
               <p:cNvSpPr/>
               <p:nvPr/>
             </p:nvSpPr>
@@ -10347,7 +10590,7 @@
           </p:sp>
           <p:sp>
             <p:nvSpPr>
-              <p:cNvPr id="299" name="d"/>
+              <p:cNvPr id="305" name="d"/>
               <p:cNvSpPr/>
               <p:nvPr/>
             </p:nvSpPr>
@@ -10398,7 +10641,7 @@
           </p:sp>
           <p:sp>
             <p:nvSpPr>
-              <p:cNvPr id="300" name="e"/>
+              <p:cNvPr id="306" name="e"/>
               <p:cNvSpPr/>
               <p:nvPr/>
             </p:nvSpPr>
@@ -10449,7 +10692,7 @@
           </p:sp>
           <p:sp>
             <p:nvSpPr>
-              <p:cNvPr id="301" name="f"/>
+              <p:cNvPr id="307" name="f"/>
               <p:cNvSpPr/>
               <p:nvPr/>
             </p:nvSpPr>
@@ -10502,7 +10745,7 @@
       </p:grpSp>
       <p:grpSp>
         <p:nvGrpSpPr>
-          <p:cNvPr id="335" name="Group"/>
+          <p:cNvPr id="341" name="Group"/>
           <p:cNvGrpSpPr/>
           <p:nvPr/>
         </p:nvGrpSpPr>
@@ -10516,7 +10759,7 @@
         </p:grpSpPr>
         <p:sp>
           <p:nvSpPr>
-            <p:cNvPr id="304" name="d"/>
+            <p:cNvPr id="310" name="d"/>
             <p:cNvSpPr/>
             <p:nvPr/>
           </p:nvSpPr>
@@ -10567,7 +10810,7 @@
         </p:sp>
         <p:sp>
           <p:nvSpPr>
-            <p:cNvPr id="305" name="e"/>
+            <p:cNvPr id="311" name="e"/>
             <p:cNvSpPr/>
             <p:nvPr/>
           </p:nvSpPr>
@@ -10618,7 +10861,7 @@
         </p:sp>
         <p:sp>
           <p:nvSpPr>
-            <p:cNvPr id="306" name="b"/>
+            <p:cNvPr id="312" name="b"/>
             <p:cNvSpPr/>
             <p:nvPr/>
           </p:nvSpPr>
@@ -10669,7 +10912,7 @@
         </p:sp>
         <p:sp>
           <p:nvSpPr>
-            <p:cNvPr id="307" name="f"/>
+            <p:cNvPr id="313" name="f"/>
             <p:cNvSpPr/>
             <p:nvPr/>
           </p:nvSpPr>
@@ -10720,7 +10963,7 @@
         </p:sp>
         <p:sp>
           <p:nvSpPr>
-            <p:cNvPr id="308" name="c"/>
+            <p:cNvPr id="314" name="c"/>
             <p:cNvSpPr/>
             <p:nvPr/>
           </p:nvSpPr>
@@ -10771,7 +11014,7 @@
         </p:sp>
         <p:sp>
           <p:nvSpPr>
-            <p:cNvPr id="309" name="Line"/>
+            <p:cNvPr id="315" name="Line"/>
             <p:cNvSpPr/>
             <p:nvPr/>
           </p:nvSpPr>
@@ -10805,7 +11048,7 @@
         </p:sp>
         <p:sp>
           <p:nvSpPr>
-            <p:cNvPr id="310" name="Line"/>
+            <p:cNvPr id="316" name="Line"/>
             <p:cNvSpPr/>
             <p:nvPr/>
           </p:nvSpPr>
@@ -10841,7 +11084,7 @@
         </p:sp>
         <p:sp>
           <p:nvSpPr>
-            <p:cNvPr id="311" name="Line"/>
+            <p:cNvPr id="317" name="Line"/>
             <p:cNvSpPr/>
             <p:nvPr/>
           </p:nvSpPr>
@@ -10877,7 +11120,7 @@
         </p:sp>
         <p:sp>
           <p:nvSpPr>
-            <p:cNvPr id="312" name="Line"/>
+            <p:cNvPr id="318" name="Line"/>
             <p:cNvSpPr/>
             <p:nvPr/>
           </p:nvSpPr>
@@ -10911,7 +11154,7 @@
         </p:sp>
         <p:sp>
           <p:nvSpPr>
-            <p:cNvPr id="313" name="Line"/>
+            <p:cNvPr id="319" name="Line"/>
             <p:cNvSpPr/>
             <p:nvPr/>
           </p:nvSpPr>
@@ -10947,7 +11190,7 @@
         </p:sp>
         <p:sp>
           <p:nvSpPr>
-            <p:cNvPr id="314" name="Line"/>
+            <p:cNvPr id="320" name="Line"/>
             <p:cNvSpPr/>
             <p:nvPr/>
           </p:nvSpPr>
@@ -10983,7 +11226,7 @@
         </p:sp>
         <p:sp>
           <p:nvSpPr>
-            <p:cNvPr id="315" name="Line"/>
+            <p:cNvPr id="321" name="Line"/>
             <p:cNvSpPr/>
             <p:nvPr/>
           </p:nvSpPr>
@@ -11017,7 +11260,7 @@
         </p:sp>
         <p:sp>
           <p:nvSpPr>
-            <p:cNvPr id="316" name="Line"/>
+            <p:cNvPr id="322" name="Line"/>
             <p:cNvSpPr/>
             <p:nvPr/>
           </p:nvSpPr>
@@ -11051,7 +11294,7 @@
         </p:sp>
         <p:sp>
           <p:nvSpPr>
-            <p:cNvPr id="317" name="Line"/>
+            <p:cNvPr id="323" name="Line"/>
             <p:cNvSpPr/>
             <p:nvPr/>
           </p:nvSpPr>
@@ -11085,7 +11328,7 @@
         </p:sp>
         <p:sp>
           <p:nvSpPr>
-            <p:cNvPr id="318" name="Line"/>
+            <p:cNvPr id="324" name="Line"/>
             <p:cNvSpPr/>
             <p:nvPr/>
           </p:nvSpPr>
@@ -11121,7 +11364,7 @@
         </p:sp>
         <p:sp>
           <p:nvSpPr>
-            <p:cNvPr id="319" name="2"/>
+            <p:cNvPr id="325" name="2"/>
             <p:cNvSpPr txBox="1"/>
             <p:nvPr/>
           </p:nvSpPr>
@@ -11172,7 +11415,7 @@
         </p:sp>
         <p:sp>
           <p:nvSpPr>
-            <p:cNvPr id="320" name="6"/>
+            <p:cNvPr id="326" name="6"/>
             <p:cNvSpPr txBox="1"/>
             <p:nvPr/>
           </p:nvSpPr>
@@ -11220,7 +11463,7 @@
         </p:sp>
         <p:sp>
           <p:nvSpPr>
-            <p:cNvPr id="321" name="3"/>
+            <p:cNvPr id="327" name="3"/>
             <p:cNvSpPr txBox="1"/>
             <p:nvPr/>
           </p:nvSpPr>
@@ -11268,7 +11511,7 @@
         </p:sp>
         <p:sp>
           <p:nvSpPr>
-            <p:cNvPr id="322" name="5"/>
+            <p:cNvPr id="328" name="5"/>
             <p:cNvSpPr txBox="1"/>
             <p:nvPr/>
           </p:nvSpPr>
@@ -11316,7 +11559,7 @@
         </p:sp>
         <p:sp>
           <p:nvSpPr>
-            <p:cNvPr id="323" name="1"/>
+            <p:cNvPr id="329" name="1"/>
             <p:cNvSpPr txBox="1"/>
             <p:nvPr/>
           </p:nvSpPr>
@@ -11364,7 +11607,7 @@
         </p:sp>
         <p:sp>
           <p:nvSpPr>
-            <p:cNvPr id="324" name="4"/>
+            <p:cNvPr id="330" name="4"/>
             <p:cNvSpPr txBox="1"/>
             <p:nvPr/>
           </p:nvSpPr>
@@ -11415,7 +11658,7 @@
         </p:sp>
         <p:sp>
           <p:nvSpPr>
-            <p:cNvPr id="325" name="4"/>
+            <p:cNvPr id="331" name="4"/>
             <p:cNvSpPr txBox="1"/>
             <p:nvPr/>
           </p:nvSpPr>
@@ -11466,7 +11709,7 @@
         </p:sp>
         <p:sp>
           <p:nvSpPr>
-            <p:cNvPr id="326" name="5"/>
+            <p:cNvPr id="332" name="5"/>
             <p:cNvSpPr txBox="1"/>
             <p:nvPr/>
           </p:nvSpPr>
@@ -11514,7 +11757,7 @@
         </p:sp>
         <p:sp>
           <p:nvSpPr>
-            <p:cNvPr id="327" name="6"/>
+            <p:cNvPr id="333" name="6"/>
             <p:cNvSpPr txBox="1"/>
             <p:nvPr/>
           </p:nvSpPr>
@@ -11565,7 +11808,7 @@
         </p:sp>
         <p:sp>
           <p:nvSpPr>
-            <p:cNvPr id="328" name="8"/>
+            <p:cNvPr id="334" name="8"/>
             <p:cNvSpPr txBox="1"/>
             <p:nvPr/>
           </p:nvSpPr>
@@ -11616,7 +11859,7 @@
         </p:sp>
         <p:sp>
           <p:nvSpPr>
-            <p:cNvPr id="329" name="a"/>
+            <p:cNvPr id="335" name="a"/>
             <p:cNvSpPr/>
             <p:nvPr/>
           </p:nvSpPr>
@@ -11667,7 +11910,7 @@
         </p:sp>
         <p:sp>
           <p:nvSpPr>
-            <p:cNvPr id="330" name="b"/>
+            <p:cNvPr id="336" name="b"/>
             <p:cNvSpPr/>
             <p:nvPr/>
           </p:nvSpPr>
@@ -11718,7 +11961,7 @@
         </p:sp>
         <p:sp>
           <p:nvSpPr>
-            <p:cNvPr id="331" name="c"/>
+            <p:cNvPr id="337" name="c"/>
             <p:cNvSpPr/>
             <p:nvPr/>
           </p:nvSpPr>
@@ -11769,7 +12012,7 @@
         </p:sp>
         <p:sp>
           <p:nvSpPr>
-            <p:cNvPr id="332" name="d"/>
+            <p:cNvPr id="338" name="d"/>
             <p:cNvSpPr/>
             <p:nvPr/>
           </p:nvSpPr>
@@ -11820,7 +12063,7 @@
         </p:sp>
         <p:sp>
           <p:nvSpPr>
-            <p:cNvPr id="333" name="e"/>
+            <p:cNvPr id="339" name="e"/>
             <p:cNvSpPr/>
             <p:nvPr/>
           </p:nvSpPr>
@@ -11871,7 +12114,7 @@
         </p:sp>
         <p:sp>
           <p:nvSpPr>
-            <p:cNvPr id="334" name="f"/>
+            <p:cNvPr id="340" name="f"/>
             <p:cNvSpPr/>
             <p:nvPr/>
           </p:nvSpPr>
@@ -11923,7 +12166,7 @@
       </p:grpSp>
       <p:sp>
         <p:nvSpPr>
-          <p:cNvPr id="336" name="Prim’s algo"/>
+          <p:cNvPr id="342" name="Prim’s algo"/>
           <p:cNvSpPr txBox="1"/>
           <p:nvPr/>
         </p:nvSpPr>
@@ -11972,7 +12215,7 @@
       </p:sp>
       <p:sp>
         <p:nvSpPr>
-          <p:cNvPr id="337" name="Dijkstra algo"/>
+          <p:cNvPr id="343" name="Dijkstra algo"/>
           <p:cNvSpPr txBox="1"/>
           <p:nvPr/>
         </p:nvSpPr>
@@ -12021,7 +12264,7 @@
       </p:sp>
       <p:sp>
         <p:nvSpPr>
-          <p:cNvPr id="338" name="cost=15, sum distance=38"/>
+          <p:cNvPr id="344" name="cost=15, sum distance=38"/>
           <p:cNvSpPr txBox="1"/>
           <p:nvPr/>
         </p:nvSpPr>
@@ -12077,7 +12320,7 @@
       </p:sp>
       <p:sp>
         <p:nvSpPr>
-          <p:cNvPr id="339" name="cost=20, sum distance=28"/>
+          <p:cNvPr id="345" name="cost=20, sum distance=28"/>
           <p:cNvSpPr txBox="1"/>
           <p:nvPr/>
         </p:nvSpPr>
@@ -12170,7 +12413,7 @@
                                       <p:cBhvr>
                                         <p:cTn id="6" fill="hold"/>
                                         <p:tgtEl>
-                                          <p:spTgt spid="233"/>
+                                          <p:spTgt spid="239"/>
                                         </p:tgtEl>
                                         <p:attrNameLst>
                                           <p:attrName>style.visibility</p:attrName>
@@ -12214,7 +12457,7 @@
                                       <p:cBhvr>
                                         <p:cTn id="10" fill="hold"/>
                                         <p:tgtEl>
-                                          <p:spTgt spid="269"/>
+                                          <p:spTgt spid="275"/>
                                         </p:tgtEl>
                                         <p:attrNameLst>
                                           <p:attrName>style.visibility</p:attrName>
@@ -12258,7 +12501,7 @@
                                       <p:cBhvr>
                                         <p:cTn id="14" fill="hold"/>
                                         <p:tgtEl>
-                                          <p:spTgt spid="336"/>
+                                          <p:spTgt spid="342"/>
                                         </p:tgtEl>
                                         <p:attrNameLst>
                                           <p:attrName>style.visibility</p:attrName>
@@ -12302,7 +12545,7 @@
                                       <p:cBhvr>
                                         <p:cTn id="18" fill="hold"/>
                                         <p:tgtEl>
-                                          <p:spTgt spid="303"/>
+                                          <p:spTgt spid="309"/>
                                         </p:tgtEl>
                                         <p:attrNameLst>
                                           <p:attrName>style.visibility</p:attrName>
@@ -12346,7 +12589,7 @@
                                       <p:cBhvr>
                                         <p:cTn id="22" fill="hold"/>
                                         <p:tgtEl>
-                                          <p:spTgt spid="337"/>
+                                          <p:spTgt spid="343"/>
                                         </p:tgtEl>
                                         <p:attrNameLst>
                                           <p:attrName>style.visibility</p:attrName>
@@ -12390,7 +12633,7 @@
                                       <p:cBhvr>
                                         <p:cTn id="26" fill="hold"/>
                                         <p:tgtEl>
-                                          <p:spTgt spid="335"/>
+                                          <p:spTgt spid="341"/>
                                         </p:tgtEl>
                                         <p:attrNameLst>
                                           <p:attrName>style.visibility</p:attrName>
@@ -12434,7 +12677,7 @@
                                       <p:cBhvr>
                                         <p:cTn id="30" fill="hold"/>
                                         <p:tgtEl>
-                                          <p:spTgt spid="338"/>
+                                          <p:spTgt spid="344"/>
                                         </p:tgtEl>
                                         <p:attrNameLst>
                                           <p:attrName>style.visibility</p:attrName>
@@ -12478,7 +12721,7 @@
                                       <p:cBhvr>
                                         <p:cTn id="34" fill="hold"/>
                                         <p:tgtEl>
-                                          <p:spTgt spid="339"/>
+                                          <p:spTgt spid="345"/>
                                         </p:tgtEl>
                                         <p:attrNameLst>
                                           <p:attrName>style.visibility</p:attrName>
@@ -12519,20 +12762,20 @@
       </p:par>
     </p:tnLst>
     <p:bldLst>
-      <p:bldP build="whole" bldLvl="1" animBg="1" rev="0" advAuto="0" spid="269" grpId="2"/>
-      <p:bldP build="whole" bldLvl="1" animBg="1" rev="0" advAuto="0" spid="339" grpId="8"/>
-      <p:bldP build="whole" bldLvl="1" animBg="1" rev="0" advAuto="0" spid="233" grpId="1"/>
-      <p:bldP build="whole" bldLvl="1" animBg="1" rev="0" advAuto="0" spid="336" grpId="3"/>
-      <p:bldP build="whole" bldLvl="1" animBg="1" rev="0" advAuto="0" spid="303" grpId="4"/>
-      <p:bldP build="whole" bldLvl="1" animBg="1" rev="0" advAuto="0" spid="335" grpId="6"/>
-      <p:bldP build="whole" bldLvl="1" animBg="1" rev="0" advAuto="0" spid="337" grpId="5"/>
-      <p:bldP build="whole" bldLvl="1" animBg="1" rev="0" advAuto="0" spid="338" grpId="7"/>
+      <p:bldP build="whole" bldLvl="1" animBg="1" rev="0" advAuto="0" spid="341" grpId="6"/>
+      <p:bldP build="whole" bldLvl="1" animBg="1" rev="0" advAuto="0" spid="345" grpId="8"/>
+      <p:bldP build="whole" bldLvl="1" animBg="1" rev="0" advAuto="0" spid="342" grpId="3"/>
+      <p:bldP build="whole" bldLvl="1" animBg="1" rev="0" advAuto="0" spid="275" grpId="2"/>
+      <p:bldP build="whole" bldLvl="1" animBg="1" rev="0" advAuto="0" spid="309" grpId="4"/>
+      <p:bldP build="whole" bldLvl="1" animBg="1" rev="0" advAuto="0" spid="343" grpId="5"/>
+      <p:bldP build="whole" bldLvl="1" animBg="1" rev="0" advAuto="0" spid="239" grpId="1"/>
+      <p:bldP build="whole" bldLvl="1" animBg="1" rev="0" advAuto="0" spid="344" grpId="7"/>
     </p:bldLst>
   </p:timing>
 </p:sld>
 </file>
 
-<file path=ppt/slides/slide18.xml><?xml version="1.0" encoding="utf-8"?>
+<file path=ppt/slides/slide19.xml><?xml version="1.0" encoding="utf-8"?>
 <p:sld xmlns:a="http://schemas.openxmlformats.org/drawingml/2006/main" xmlns:r="http://schemas.openxmlformats.org/officeDocument/2006/relationships" xmlns:p="http://schemas.openxmlformats.org/presentationml/2006/main" xmlns:m="http://schemas.openxmlformats.org/officeDocument/2006/math" xmlns:a14="http://schemas.microsoft.com/office/drawing/2010/main" showMasterSp="1" showMasterPhAnim="1">
   <p:cSld>
     <p:spTree>
@@ -12551,7 +12794,7 @@
       </p:grpSpPr>
       <p:sp>
         <p:nvSpPr>
-          <p:cNvPr id="341" name="Summary"/>
+          <p:cNvPr id="347" name="Summary"/>
           <p:cNvSpPr txBox="1"/>
           <p:nvPr>
             <p:ph type="title"/>
@@ -12575,7 +12818,7 @@
       </p:sp>
       <p:sp>
         <p:nvSpPr>
-          <p:cNvPr id="342" name="Dijkstra’s algorithm…"/>
+          <p:cNvPr id="348" name="Dijkstra’s algorithm…"/>
           <p:cNvSpPr txBox="1"/>
           <p:nvPr>
             <p:ph type="body" idx="1"/>
@@ -12647,7 +12890,7 @@
       </p:sp>
       <p:sp>
         <p:nvSpPr>
-          <p:cNvPr id="343" name="Slide Number"/>
+          <p:cNvPr id="349" name="Slide Number"/>
           <p:cNvSpPr txBox="1"/>
           <p:nvPr>
             <p:ph type="sldNum" sz="quarter" idx="2"/>
@@ -12674,7 +12917,7 @@
       </p:sp>
       <p:sp>
         <p:nvSpPr>
-          <p:cNvPr id="344" name="DAA/Greedy Algorithms"/>
+          <p:cNvPr id="350" name="DAA/Greedy Algorithms"/>
           <p:cNvSpPr txBox="1"/>
           <p:nvPr/>
         </p:nvSpPr>
@@ -12714,7 +12957,7 @@
       </p:sp>
       <p:sp>
         <p:nvSpPr>
-          <p:cNvPr id="345" name="RPR/"/>
+          <p:cNvPr id="351" name="RPR/"/>
           <p:cNvSpPr txBox="1"/>
           <p:nvPr/>
         </p:nvSpPr>
@@ -21512,52 +21755,52 @@
       </p:par>
     </p:tnLst>
     <p:bldLst>
-      <p:bldP build="whole" bldLvl="1" animBg="1" rev="0" advAuto="0" spid="159" grpId="36"/>
+      <p:bldP build="whole" bldLvl="1" animBg="1" rev="0" advAuto="0" spid="115" grpId="29"/>
+      <p:bldP build="whole" bldLvl="1" animBg="1" rev="0" advAuto="0" spid="145" grpId="16"/>
+      <p:bldP build="whole" bldLvl="1" animBg="1" rev="0" advAuto="0" spid="155" grpId="26"/>
+      <p:bldP build="whole" bldLvl="1" animBg="1" rev="0" advAuto="0" spid="114" grpId="1"/>
+      <p:bldP build="whole" bldLvl="1" animBg="1" rev="0" advAuto="0" spid="119" grpId="20"/>
+      <p:bldP build="whole" bldLvl="1" animBg="1" rev="0" advAuto="0" spid="152" grpId="45"/>
       <p:bldP build="whole" bldLvl="1" animBg="1" rev="0" advAuto="0" spid="116" grpId="25"/>
-      <p:bldP build="whole" bldLvl="1" animBg="1" rev="0" advAuto="0" spid="119" grpId="20"/>
-      <p:bldP build="whole" bldLvl="1" animBg="1" rev="0" advAuto="0" spid="145" grpId="16"/>
       <p:bldP build="whole" bldLvl="1" animBg="1" rev="0" advAuto="0" spid="155" grpId="33"/>
-      <p:bldP build="whole" bldLvl="1" animBg="1" rev="0" advAuto="0" spid="161" grpId="46"/>
+      <p:bldP build="whole" bldLvl="1" animBg="1" rev="0" advAuto="0" spid="143" grpId="21"/>
+      <p:bldP build="whole" bldLvl="1" animBg="1" rev="0" advAuto="0" spid="149" grpId="27"/>
+      <p:bldP build="whole" bldLvl="1" animBg="1" rev="0" advAuto="0" spid="115" grpId="37"/>
+      <p:bldP build="whole" bldLvl="1" animBg="1" rev="0" advAuto="0" spid="141" grpId="4"/>
+      <p:bldP build="whole" bldLvl="1" animBg="1" rev="0" advAuto="0" spid="156" grpId="31"/>
       <p:bldP build="whole" bldLvl="1" animBg="1" rev="0" advAuto="0" spid="155" grpId="40"/>
+      <p:bldP build="whole" bldLvl="1" animBg="1" rev="0" advAuto="0" spid="150" grpId="35"/>
+      <p:bldP build="whole" bldLvl="1" animBg="1" rev="0" advAuto="0" spid="115" grpId="43"/>
+      <p:bldP build="whole" bldLvl="1" animBg="1" rev="0" advAuto="0" spid="141" grpId="10"/>
+      <p:bldP build="whole" bldLvl="1" animBg="1" rev="0" advAuto="0" spid="154" grpId="41"/>
+      <p:bldP build="whole" bldLvl="1" animBg="1" rev="0" advAuto="0" spid="156" grpId="38"/>
       <p:bldP build="whole" bldLvl="1" animBg="1" rev="0" advAuto="0" spid="116" grpId="39"/>
-      <p:bldP build="whole" bldLvl="1" animBg="1" rev="0" advAuto="0" spid="153" grpId="14"/>
-      <p:bldP build="whole" bldLvl="1" animBg="1" rev="0" advAuto="0" spid="148" grpId="11"/>
-      <p:bldP build="whole" bldLvl="1" animBg="1" rev="0" advAuto="0" spid="157" grpId="19"/>
-      <p:bldP build="whole" bldLvl="1" animBg="1" rev="0" advAuto="0" spid="140" grpId="2"/>
-      <p:bldP build="whole" bldLvl="1" animBg="1" rev="0" advAuto="0" spid="143" grpId="5"/>
-      <p:bldP build="whole" bldLvl="1" animBg="1" rev="0" advAuto="0" spid="153" grpId="24"/>
+      <p:bldP build="whole" bldLvl="1" animBg="1" rev="0" advAuto="0" spid="142" grpId="3"/>
+      <p:bldP build="whole" bldLvl="1" animBg="1" rev="0" advAuto="0" spid="156" grpId="44"/>
+      <p:bldP build="whole" bldLvl="1" animBg="1" rev="0" advAuto="0" spid="146" grpId="6"/>
       <p:bldP build="whole" bldLvl="1" animBg="1" rev="0" advAuto="0" spid="158" grpId="28"/>
       <p:bldP build="whole" bldLvl="1" animBg="1" rev="0" advAuto="0" spid="118" grpId="12"/>
-      <p:bldP build="whole" bldLvl="1" animBg="1" rev="0" advAuto="0" spid="141" grpId="4"/>
+      <p:bldP build="whole" bldLvl="1" animBg="1" rev="0" advAuto="0" spid="153" grpId="14"/>
+      <p:bldP build="whole" bldLvl="1" animBg="1" rev="0" advAuto="0" spid="159" grpId="36"/>
       <p:bldP build="whole" bldLvl="1" animBg="1" rev="0" advAuto="0" spid="144" grpId="8"/>
+      <p:bldP build="whole" bldLvl="1" animBg="1" rev="0" advAuto="0" spid="117" grpId="9"/>
+      <p:bldP build="whole" bldLvl="1" animBg="1" rev="0" advAuto="0" spid="153" grpId="24"/>
+      <p:bldP build="whole" bldLvl="1" animBg="1" rev="0" advAuto="0" spid="147" grpId="18"/>
+      <p:bldP build="whole" bldLvl="1" animBg="1" rev="0" advAuto="0" spid="144" grpId="13"/>
+      <p:bldP build="whole" bldLvl="1" animBg="1" rev="0" advAuto="0" spid="118" grpId="23"/>
+      <p:bldP build="whole" bldLvl="1" animBg="1" rev="0" advAuto="0" spid="140" grpId="2"/>
+      <p:bldP build="whole" bldLvl="1" animBg="1" rev="0" advAuto="0" spid="148" grpId="11"/>
       <p:bldP build="whole" bldLvl="1" animBg="1" rev="0" advAuto="0" spid="153" grpId="32"/>
-      <p:bldP build="whole" bldLvl="1" animBg="1" rev="0" advAuto="0" spid="149" grpId="27"/>
-      <p:bldP build="whole" bldLvl="1" animBg="1" rev="0" advAuto="0" spid="141" grpId="10"/>
-      <p:bldP build="whole" bldLvl="1" animBg="1" rev="0" advAuto="0" spid="144" grpId="13"/>
-      <p:bldP build="whole" bldLvl="1" animBg="1" rev="0" advAuto="0" spid="146" grpId="6"/>
-      <p:bldP build="whole" bldLvl="1" animBg="1" rev="0" advAuto="0" spid="143" grpId="21"/>
-      <p:bldP build="whole" bldLvl="1" animBg="1" rev="0" advAuto="0" spid="156" grpId="31"/>
-      <p:bldP build="whole" bldLvl="1" animBg="1" rev="0" advAuto="0" spid="118" grpId="23"/>
-      <p:bldP build="whole" bldLvl="1" animBg="1" rev="0" advAuto="0" spid="115" grpId="29"/>
-      <p:bldP build="whole" bldLvl="1" animBg="1" rev="0" advAuto="0" spid="150" grpId="35"/>
-      <p:bldP build="whole" bldLvl="1" animBg="1" rev="0" advAuto="0" spid="154" grpId="41"/>
-      <p:bldP build="whole" bldLvl="1" animBg="1" rev="0" advAuto="0" spid="114" grpId="1"/>
-      <p:bldP build="whole" bldLvl="1" animBg="1" rev="0" advAuto="0" spid="156" grpId="38"/>
+      <p:bldP build="whole" bldLvl="1" animBg="1" rev="0" advAuto="0" spid="146" grpId="30"/>
+      <p:bldP build="whole" bldLvl="1" animBg="1" rev="0" advAuto="0" spid="118" grpId="34"/>
+      <p:bldP build="whole" bldLvl="1" animBg="1" rev="0" advAuto="0" spid="143" grpId="5"/>
+      <p:bldP build="whole" bldLvl="1" animBg="1" rev="0" advAuto="0" spid="145" grpId="7"/>
+      <p:bldP build="whole" bldLvl="1" animBg="1" rev="0" advAuto="0" spid="155" grpId="17"/>
+      <p:bldP build="whole" bldLvl="1" animBg="1" rev="0" advAuto="0" spid="157" grpId="19"/>
+      <p:bldP build="whole" bldLvl="1" animBg="1" rev="0" advAuto="0" spid="161" grpId="46"/>
+      <p:bldP build="whole" bldLvl="1" animBg="1" rev="0" advAuto="0" spid="151" grpId="22"/>
+      <p:bldP build="whole" bldLvl="1" animBg="1" rev="0" advAuto="0" spid="116" grpId="15"/>
       <p:bldP build="whole" bldLvl="1" animBg="1" rev="0" advAuto="0" spid="160" grpId="42"/>
-      <p:bldP build="whole" bldLvl="1" animBg="1" rev="0" advAuto="0" spid="118" grpId="34"/>
-      <p:bldP build="whole" bldLvl="1" animBg="1" rev="0" advAuto="0" spid="155" grpId="17"/>
-      <p:bldP build="whole" bldLvl="1" animBg="1" rev="0" advAuto="0" spid="117" grpId="9"/>
-      <p:bldP build="whole" bldLvl="1" animBg="1" rev="0" advAuto="0" spid="115" grpId="37"/>
-      <p:bldP build="whole" bldLvl="1" animBg="1" rev="0" advAuto="0" spid="156" grpId="44"/>
-      <p:bldP build="whole" bldLvl="1" animBg="1" rev="0" advAuto="0" spid="147" grpId="18"/>
-      <p:bldP build="whole" bldLvl="1" animBg="1" rev="0" advAuto="0" spid="116" grpId="15"/>
-      <p:bldP build="whole" bldLvl="1" animBg="1" rev="0" advAuto="0" spid="142" grpId="3"/>
-      <p:bldP build="whole" bldLvl="1" animBg="1" rev="0" advAuto="0" spid="145" grpId="7"/>
-      <p:bldP build="whole" bldLvl="1" animBg="1" rev="0" advAuto="0" spid="115" grpId="43"/>
-      <p:bldP build="whole" bldLvl="1" animBg="1" rev="0" advAuto="0" spid="155" grpId="26"/>
-      <p:bldP build="whole" bldLvl="1" animBg="1" rev="0" advAuto="0" spid="152" grpId="45"/>
-      <p:bldP build="whole" bldLvl="1" animBg="1" rev="0" advAuto="0" spid="146" grpId="30"/>
-      <p:bldP build="whole" bldLvl="1" animBg="1" rev="0" advAuto="0" spid="151" grpId="22"/>
     </p:bldLst>
   </p:timing>
 </p:sld>
@@ -22839,8 +23082,8 @@
     </p:tnLst>
     <p:bldLst>
       <p:bldP build="p" bldLvl="5" animBg="1" rev="0" advAuto="0" spid="164" grpId="1"/>
+      <p:bldP build="whole" bldLvl="1" animBg="1" rev="0" advAuto="0" spid="180" grpId="2"/>
       <p:bldP build="whole" bldLvl="1" animBg="1" rev="0" advAuto="0" spid="181" grpId="3"/>
-      <p:bldP build="whole" bldLvl="1" animBg="1" rev="0" advAuto="0" spid="180" grpId="2"/>
       <p:bldP build="whole" bldLvl="1" animBg="1" rev="0" advAuto="0" spid="182" grpId="4"/>
     </p:bldLst>
   </p:timing>

</xml_diff>